<commit_message>
IFC Patch Extension - Version 1
</commit_message>
<xml_diff>
--- a/Presentation/Pitch.pptx
+++ b/Presentation/Pitch.pptx
@@ -11,11 +11,11 @@
     <p:sldId id="258" r:id="rId2"/>
     <p:sldId id="259" r:id="rId3"/>
     <p:sldId id="260" r:id="rId4"/>
-    <p:sldId id="261" r:id="rId5"/>
-    <p:sldId id="262" r:id="rId6"/>
-    <p:sldId id="263" r:id="rId7"/>
-    <p:sldId id="264" r:id="rId8"/>
-    <p:sldId id="257" r:id="rId9"/>
+    <p:sldId id="262" r:id="rId5"/>
+    <p:sldId id="263" r:id="rId6"/>
+    <p:sldId id="264" r:id="rId7"/>
+    <p:sldId id="265" r:id="rId8"/>
+    <p:sldId id="266" r:id="rId9"/>
   </p:sldIdLst>
   <p:sldSz cx="12192000" cy="6858000"/>
   <p:notesSz cx="6858000" cy="9144000"/>
@@ -114,6 +114,11 @@
       </a:defRPr>
     </a:lvl9pPr>
   </p:defaultTextStyle>
+  <p:extLst>
+    <p:ext uri="{EFAFB233-063F-42B5-8137-9DF3F51BA10A}">
+      <p15:sldGuideLst xmlns:p15="http://schemas.microsoft.com/office/powerpoint/2012/main"/>
+    </p:ext>
+  </p:extLst>
 </p:presentation>
 </file>
 
@@ -510,7 +515,7 @@
           <a:bodyPr/>
           <a:lstStyle/>
           <a:p>
-            <a:endParaRPr lang="de-DE" dirty="0"/>
+            <a:endParaRPr lang="de-DE"/>
           </a:p>
         </p:txBody>
       </p:sp>
@@ -531,7 +536,7 @@
           <a:p>
             <a:fld id="{458A7E8C-898C-4771-A96C-641A15F9FBDA}" type="slidenum">
               <a:rPr lang="de-DE" smtClean="0"/>
-              <a:t>6</a:t>
+              <a:t>5</a:t>
             </a:fld>
             <a:endParaRPr lang="de-DE"/>
           </a:p>
@@ -612,7 +617,7 @@
           <a:bodyPr/>
           <a:lstStyle/>
           <a:p>
-            <a:endParaRPr lang="de-DE" dirty="0"/>
+            <a:endParaRPr lang="de-DE"/>
           </a:p>
         </p:txBody>
       </p:sp>
@@ -639,7 +644,7 @@
           <a:p>
             <a:fld id="{458A7E8C-898C-4771-A96C-641A15F9FBDA}" type="slidenum">
               <a:rPr lang="de-DE" smtClean="0"/>
-              <a:t>7</a:t>
+              <a:t>6</a:t>
             </a:fld>
             <a:endParaRPr lang="de-DE"/>
           </a:p>
@@ -649,6 +654,114 @@
     <p:extLst>
       <p:ext uri="{BB962C8B-B14F-4D97-AF65-F5344CB8AC3E}">
         <p14:creationId xmlns:p14="http://schemas.microsoft.com/office/powerpoint/2010/main" val="2448717182"/>
+      </p:ext>
+    </p:extLst>
+  </p:cSld>
+  <p:clrMapOvr>
+    <a:masterClrMapping/>
+  </p:clrMapOvr>
+</p:notes>
+</file>
+
+<file path=ppt/notesSlides/notesSlide3.xml><?xml version="1.0" encoding="utf-8"?>
+<p:notes xmlns:a="http://schemas.openxmlformats.org/drawingml/2006/main" xmlns:r="http://schemas.openxmlformats.org/officeDocument/2006/relationships" xmlns:p="http://schemas.openxmlformats.org/presentationml/2006/main">
+  <p:cSld>
+    <p:spTree>
+      <p:nvGrpSpPr>
+        <p:cNvPr id="1" name="">
+          <a:extLst>
+            <a:ext uri="{FF2B5EF4-FFF2-40B4-BE49-F238E27FC236}">
+              <a16:creationId xmlns:a16="http://schemas.microsoft.com/office/drawing/2014/main" id="{44442749-0F8A-04C5-7C2F-E69C7343490E}"/>
+            </a:ext>
+          </a:extLst>
+        </p:cNvPr>
+        <p:cNvGrpSpPr/>
+        <p:nvPr/>
+      </p:nvGrpSpPr>
+      <p:grpSpPr>
+        <a:xfrm>
+          <a:off x="0" y="0"/>
+          <a:ext cx="0" cy="0"/>
+          <a:chOff x="0" y="0"/>
+          <a:chExt cx="0" cy="0"/>
+        </a:xfrm>
+      </p:grpSpPr>
+      <p:sp>
+        <p:nvSpPr>
+          <p:cNvPr id="2" name="Folienbildplatzhalter 1">
+            <a:extLst>
+              <a:ext uri="{FF2B5EF4-FFF2-40B4-BE49-F238E27FC236}">
+                <a16:creationId xmlns:a16="http://schemas.microsoft.com/office/drawing/2014/main" id="{92EE042E-1DD8-AC5B-B309-81F64AC0384F}"/>
+              </a:ext>
+            </a:extLst>
+          </p:cNvPr>
+          <p:cNvSpPr>
+            <a:spLocks noGrp="1" noRot="1" noChangeAspect="1"/>
+          </p:cNvSpPr>
+          <p:nvPr>
+            <p:ph type="sldImg"/>
+          </p:nvPr>
+        </p:nvSpPr>
+        <p:spPr/>
+      </p:sp>
+      <p:sp>
+        <p:nvSpPr>
+          <p:cNvPr id="3" name="Notizenplatzhalter 2">
+            <a:extLst>
+              <a:ext uri="{FF2B5EF4-FFF2-40B4-BE49-F238E27FC236}">
+                <a16:creationId xmlns:a16="http://schemas.microsoft.com/office/drawing/2014/main" id="{669046DE-F44A-8459-F38C-6753032DA9FF}"/>
+              </a:ext>
+            </a:extLst>
+          </p:cNvPr>
+          <p:cNvSpPr>
+            <a:spLocks noGrp="1"/>
+          </p:cNvSpPr>
+          <p:nvPr>
+            <p:ph type="body" idx="1"/>
+          </p:nvPr>
+        </p:nvSpPr>
+        <p:spPr/>
+        <p:txBody>
+          <a:bodyPr/>
+          <a:lstStyle/>
+          <a:p>
+            <a:endParaRPr lang="de-DE"/>
+          </a:p>
+        </p:txBody>
+      </p:sp>
+      <p:sp>
+        <p:nvSpPr>
+          <p:cNvPr id="4" name="Foliennummernplatzhalter 3">
+            <a:extLst>
+              <a:ext uri="{FF2B5EF4-FFF2-40B4-BE49-F238E27FC236}">
+                <a16:creationId xmlns:a16="http://schemas.microsoft.com/office/drawing/2014/main" id="{BADD6901-3182-CB3B-439D-0E3E9EAE83CD}"/>
+              </a:ext>
+            </a:extLst>
+          </p:cNvPr>
+          <p:cNvSpPr>
+            <a:spLocks noGrp="1"/>
+          </p:cNvSpPr>
+          <p:nvPr>
+            <p:ph type="sldNum" sz="quarter" idx="5"/>
+          </p:nvPr>
+        </p:nvSpPr>
+        <p:spPr/>
+        <p:txBody>
+          <a:bodyPr/>
+          <a:lstStyle/>
+          <a:p>
+            <a:fld id="{458A7E8C-898C-4771-A96C-641A15F9FBDA}" type="slidenum">
+              <a:rPr lang="de-DE" smtClean="0"/>
+              <a:t>8</a:t>
+            </a:fld>
+            <a:endParaRPr lang="de-DE"/>
+          </a:p>
+        </p:txBody>
+      </p:sp>
+    </p:spTree>
+    <p:extLst>
+      <p:ext uri="{BB962C8B-B14F-4D97-AF65-F5344CB8AC3E}">
+        <p14:creationId xmlns:p14="http://schemas.microsoft.com/office/powerpoint/2010/main" val="2278166628"/>
       </p:ext>
     </p:extLst>
   </p:cSld>
@@ -3901,16 +4014,16 @@
           <a:lstStyle/>
           <a:p>
             <a:br>
-              <a:rPr lang="de-DE" b="1" dirty="0"/>
+              <a:rPr lang="de-DE" b="1"/>
             </a:br>
             <a:r>
-              <a:rPr lang="de-DE" b="1" dirty="0"/>
+              <a:rPr lang="de-DE" b="1"/>
               <a:t>Hackathon zum BIM-Portal des Bundes</a:t>
             </a:r>
             <a:br>
-              <a:rPr lang="de-DE" b="1" dirty="0"/>
+              <a:rPr lang="de-DE" b="1"/>
             </a:br>
-            <a:endParaRPr lang="de-DE" dirty="0"/>
+            <a:endParaRPr lang="de-DE"/>
           </a:p>
         </p:txBody>
       </p:sp>
@@ -3946,14 +4059,14 @@
               <a:buNone/>
             </a:pPr>
             <a:r>
-              <a:rPr lang="de-DE" dirty="0" err="1">
+              <a:rPr lang="de-DE" err="1">
                 <a:solidFill>
                   <a:srgbClr val="209E41"/>
                 </a:solidFill>
               </a:rPr>
               <a:t>onsai</a:t>
             </a:r>
-            <a:endParaRPr lang="de-DE" dirty="0">
+            <a:endParaRPr lang="de-DE">
               <a:solidFill>
                 <a:srgbClr val="209E41"/>
               </a:solidFill>
@@ -4039,10 +4152,10 @@
           </a:lstStyle>
           <a:p>
             <a:r>
-              <a:rPr lang="de-DE" sz="6600" b="1" dirty="0"/>
+              <a:rPr lang="de-DE" sz="6600" b="1"/>
               <a:t>Team </a:t>
             </a:r>
-            <a:endParaRPr lang="de-DE" sz="6600" dirty="0"/>
+            <a:endParaRPr lang="de-DE" sz="6600"/>
           </a:p>
         </p:txBody>
       </p:sp>
@@ -4305,7 +4418,7 @@
               <a:buNone/>
             </a:pPr>
             <a:r>
-              <a:rPr lang="de-DE" sz="3300" dirty="0"/>
+              <a:rPr lang="de-DE" sz="3300"/>
               <a:t>Challenge 4: Anbindung von Softwareprodukten an das BIM-Portal</a:t>
             </a:r>
           </a:p>
@@ -4316,7 +4429,7 @@
               </a:spcAft>
               <a:buNone/>
             </a:pPr>
-            <a:endParaRPr lang="de-DE" sz="2400" dirty="0"/>
+            <a:endParaRPr lang="de-DE" sz="2400"/>
           </a:p>
           <a:p>
             <a:pPr marL="0" indent="0">
@@ -4329,10 +4442,10 @@
               <a:buNone/>
             </a:pPr>
             <a:r>
-              <a:rPr lang="de-DE" dirty="0"/>
+              <a:rPr lang="de-DE"/>
               <a:t>Volker Krieger (Koordination)</a:t>
             </a:r>
-            <a:endParaRPr lang="de-DE" sz="2400" b="0" dirty="0">
+            <a:endParaRPr lang="de-DE" sz="2400" b="0">
               <a:effectLst/>
             </a:endParaRPr>
           </a:p>
@@ -4347,10 +4460,10 @@
               <a:buNone/>
             </a:pPr>
             <a:r>
-              <a:rPr lang="de-DE" dirty="0"/>
+              <a:rPr lang="de-DE"/>
               <a:t>Matthias Weise (AEC3 Deutschland GmbH)</a:t>
             </a:r>
-            <a:endParaRPr lang="de-DE" sz="3600" b="0" dirty="0">
+            <a:endParaRPr lang="de-DE" sz="3600" b="0">
               <a:effectLst/>
             </a:endParaRPr>
           </a:p>
@@ -4365,18 +4478,18 @@
               <a:buNone/>
             </a:pPr>
             <a:r>
-              <a:rPr lang="de-DE" dirty="0"/>
+              <a:rPr lang="de-DE"/>
               <a:t>Bernd Gmeiner (</a:t>
             </a:r>
             <a:r>
-              <a:rPr lang="de-DE" dirty="0" err="1"/>
+              <a:rPr lang="de-DE" err="1"/>
               <a:t>Egnaton</a:t>
             </a:r>
             <a:r>
-              <a:rPr lang="de-DE" dirty="0"/>
+              <a:rPr lang="de-DE"/>
               <a:t> e.V.)</a:t>
             </a:r>
-            <a:endParaRPr lang="de-DE" sz="2400" b="0" dirty="0">
+            <a:endParaRPr lang="de-DE" sz="2400" b="0">
               <a:effectLst/>
             </a:endParaRPr>
           </a:p>
@@ -4391,7 +4504,7 @@
               <a:buNone/>
             </a:pPr>
             <a:r>
-              <a:rPr lang="de-DE" i="1" dirty="0">
+              <a:rPr lang="de-DE" i="1">
                 <a:solidFill>
                   <a:schemeClr val="bg1">
                     <a:lumMod val="50000"/>
@@ -4400,7 +4513,7 @@
               </a:rPr>
               <a:t>Arnim Spengler (HRW, remote)</a:t>
             </a:r>
-            <a:endParaRPr lang="de-DE" sz="2400" b="0" i="1" dirty="0">
+            <a:endParaRPr lang="de-DE" sz="2400" b="0" i="1">
               <a:solidFill>
                 <a:schemeClr val="bg1">
                   <a:lumMod val="50000"/>
@@ -4420,7 +4533,7 @@
               <a:buNone/>
             </a:pPr>
             <a:r>
-              <a:rPr lang="de-DE" i="1" dirty="0">
+              <a:rPr lang="de-DE" i="1">
                 <a:solidFill>
                   <a:schemeClr val="bg1">
                     <a:lumMod val="50000"/>
@@ -4430,7 +4543,7 @@
               <a:t>Peter </a:t>
             </a:r>
             <a:r>
-              <a:rPr lang="de-DE" i="1" dirty="0" err="1">
+              <a:rPr lang="de-DE" i="1" err="1">
                 <a:solidFill>
                   <a:schemeClr val="bg1">
                     <a:lumMod val="50000"/>
@@ -4440,7 +4553,7 @@
               <a:t>Kompolschek</a:t>
             </a:r>
             <a:r>
-              <a:rPr lang="de-DE" i="1" dirty="0">
+              <a:rPr lang="de-DE" i="1">
                 <a:solidFill>
                   <a:schemeClr val="bg1">
                     <a:lumMod val="50000"/>
@@ -4450,7 +4563,7 @@
               <a:t> (Architekt </a:t>
             </a:r>
             <a:r>
-              <a:rPr lang="de-DE" i="1" dirty="0" err="1">
+              <a:rPr lang="de-DE" i="1" err="1">
                 <a:solidFill>
                   <a:schemeClr val="bg1">
                     <a:lumMod val="50000"/>
@@ -4460,7 +4573,7 @@
               <a:t>Kompolschek</a:t>
             </a:r>
             <a:r>
-              <a:rPr lang="de-DE" i="1" dirty="0">
+              <a:rPr lang="de-DE" i="1">
                 <a:solidFill>
                   <a:schemeClr val="bg1">
                     <a:lumMod val="50000"/>
@@ -4470,7 +4583,7 @@
               <a:t>, remote)</a:t>
             </a:r>
             <a:br>
-              <a:rPr lang="de-DE" sz="2400" i="1" dirty="0">
+              <a:rPr lang="de-DE" sz="2400" i="1">
                 <a:solidFill>
                   <a:schemeClr val="bg1">
                     <a:lumMod val="50000"/>
@@ -4478,7 +4591,7 @@
                 </a:solidFill>
               </a:rPr>
             </a:br>
-            <a:endParaRPr lang="de-DE" sz="2400" i="1" dirty="0">
+            <a:endParaRPr lang="de-DE" sz="2400" i="1">
               <a:solidFill>
                 <a:schemeClr val="bg1">
                   <a:lumMod val="50000"/>
@@ -4540,7 +4653,7 @@
           <a:lstStyle/>
           <a:p>
             <a:r>
-              <a:rPr lang="de-DE" sz="4000" b="1" dirty="0"/>
+              <a:rPr lang="de-DE" sz="4000" b="1"/>
               <a:t>Einordnung der Lösung</a:t>
             </a:r>
           </a:p>
@@ -4582,6 +4695,41 @@
           </a:prstGeom>
         </p:spPr>
       </p:pic>
+      <p:sp>
+        <p:nvSpPr>
+          <p:cNvPr id="3" name="Textfeld 2">
+            <a:extLst>
+              <a:ext uri="{FF2B5EF4-FFF2-40B4-BE49-F238E27FC236}">
+                <a16:creationId xmlns:a16="http://schemas.microsoft.com/office/drawing/2014/main" id="{E7D57314-4261-7A85-EC6B-18FCCDF3BB12}"/>
+              </a:ext>
+            </a:extLst>
+          </p:cNvPr>
+          <p:cNvSpPr txBox="1"/>
+          <p:nvPr/>
+        </p:nvSpPr>
+        <p:spPr>
+          <a:xfrm>
+            <a:off x="3390868" y="6492875"/>
+            <a:ext cx="5410264" cy="338554"/>
+          </a:xfrm>
+          <a:prstGeom prst="rect">
+            <a:avLst/>
+          </a:prstGeom>
+          <a:noFill/>
+        </p:spPr>
+        <p:txBody>
+          <a:bodyPr wrap="none" rtlCol="0">
+            <a:spAutoFit/>
+          </a:bodyPr>
+          <a:lstStyle/>
+          <a:p>
+            <a:r>
+              <a:rPr lang="de-DE" sz="1600"/>
+              <a:t>Team Bonsai – Hackathon zum BIM-Portal des Bundes 2025</a:t>
+            </a:r>
+          </a:p>
+        </p:txBody>
+      </p:sp>
     </p:spTree>
     <p:extLst>
       <p:ext uri="{BB962C8B-B14F-4D97-AF65-F5344CB8AC3E}">
@@ -4640,7 +4788,7 @@
           <a:lstStyle/>
           <a:p>
             <a:r>
-              <a:rPr lang="de-DE" sz="4000" b="1" dirty="0"/>
+              <a:rPr lang="de-DE" sz="4000" b="1"/>
               <a:t>Einordnung der Lösung</a:t>
             </a:r>
           </a:p>
@@ -4704,8 +4852,8 @@
         </p:blipFill>
         <p:spPr>
           <a:xfrm>
-            <a:off x="6096000" y="2033062"/>
-            <a:ext cx="1711455" cy="1605810"/>
+            <a:off x="7174760" y="2960844"/>
+            <a:ext cx="775081" cy="727236"/>
           </a:xfrm>
           <a:prstGeom prst="rect">
             <a:avLst/>
@@ -4733,10 +4881,11 @@
             <a:avLst/>
           </a:prstGeom>
           <a:noFill/>
-          <a:ln>
+          <a:ln w="57150">
             <a:solidFill>
-              <a:srgbClr val="C00000"/>
+              <a:srgbClr val="209E41"/>
             </a:solidFill>
+            <a:prstDash val="sysDash"/>
           </a:ln>
         </p:spPr>
         <p:style>
@@ -4764,6 +4913,41 @@
           </a:p>
         </p:txBody>
       </p:sp>
+      <p:sp>
+        <p:nvSpPr>
+          <p:cNvPr id="4" name="Textfeld 3">
+            <a:extLst>
+              <a:ext uri="{FF2B5EF4-FFF2-40B4-BE49-F238E27FC236}">
+                <a16:creationId xmlns:a16="http://schemas.microsoft.com/office/drawing/2014/main" id="{89E40547-09B0-7FB1-1C3B-F81FB5BFF7E9}"/>
+              </a:ext>
+            </a:extLst>
+          </p:cNvPr>
+          <p:cNvSpPr txBox="1"/>
+          <p:nvPr/>
+        </p:nvSpPr>
+        <p:spPr>
+          <a:xfrm>
+            <a:off x="3390868" y="6492875"/>
+            <a:ext cx="5410264" cy="338554"/>
+          </a:xfrm>
+          <a:prstGeom prst="rect">
+            <a:avLst/>
+          </a:prstGeom>
+          <a:noFill/>
+        </p:spPr>
+        <p:txBody>
+          <a:bodyPr wrap="none" rtlCol="0">
+            <a:spAutoFit/>
+          </a:bodyPr>
+          <a:lstStyle/>
+          <a:p>
+            <a:r>
+              <a:rPr lang="de-DE" sz="1600"/>
+              <a:t>Team Bonsai – Hackathon zum BIM-Portal des Bundes 2025</a:t>
+            </a:r>
+          </a:p>
+        </p:txBody>
+      </p:sp>
     </p:spTree>
     <p:extLst>
       <p:ext uri="{BB962C8B-B14F-4D97-AF65-F5344CB8AC3E}">
@@ -4774,6 +4958,18 @@
   <p:clrMapOvr>
     <a:masterClrMapping/>
   </p:clrMapOvr>
+  <mc:AlternateContent xmlns:mc="http://schemas.openxmlformats.org/markup-compatibility/2006">
+    <mc:Choice xmlns:p159="http://schemas.microsoft.com/office/powerpoint/2015/09/main" Requires="p159">
+      <p:transition xmlns:p14="http://schemas.microsoft.com/office/powerpoint/2010/main" spd="slow" p14:dur="2000">
+        <p159:morph option="byObject"/>
+      </p:transition>
+    </mc:Choice>
+    <mc:Fallback>
+      <p:transition spd="slow">
+        <p:fade/>
+      </p:transition>
+    </mc:Fallback>
+  </mc:AlternateContent>
 </p:sld>
 </file>
 
@@ -4785,7 +4981,7 @@
         <p:cNvPr id="1" name="">
           <a:extLst>
             <a:ext uri="{FF2B5EF4-FFF2-40B4-BE49-F238E27FC236}">
-              <a16:creationId xmlns:a16="http://schemas.microsoft.com/office/drawing/2014/main" id="{1332CF60-1FEA-BE63-9E79-59204E25FBF1}"/>
+              <a16:creationId xmlns:a16="http://schemas.microsoft.com/office/drawing/2014/main" id="{1B9A40D4-63CE-8B7D-4FA6-3916EDCEBD53}"/>
             </a:ext>
           </a:extLst>
         </p:cNvPr>
@@ -4805,7 +5001,7 @@
           <p:cNvPr id="2" name="Titel 1">
             <a:extLst>
               <a:ext uri="{FF2B5EF4-FFF2-40B4-BE49-F238E27FC236}">
-                <a16:creationId xmlns:a16="http://schemas.microsoft.com/office/drawing/2014/main" id="{6B466C01-4FD5-C426-08E1-B32F00B85722}"/>
+                <a16:creationId xmlns:a16="http://schemas.microsoft.com/office/drawing/2014/main" id="{3F935689-A6D1-5296-8EC6-43DC980549FA}"/>
               </a:ext>
             </a:extLst>
           </p:cNvPr>
@@ -4822,7 +5018,7 @@
           <a:lstStyle/>
           <a:p>
             <a:r>
-              <a:rPr lang="de-DE" sz="4000" b="1" dirty="0"/>
+              <a:rPr lang="de-DE" sz="4000" b="1"/>
               <a:t>Challenge des Planers</a:t>
             </a:r>
           </a:p>
@@ -4833,7 +5029,7 @@
           <p:cNvPr id="7" name="Grafik 6">
             <a:extLst>
               <a:ext uri="{FF2B5EF4-FFF2-40B4-BE49-F238E27FC236}">
-                <a16:creationId xmlns:a16="http://schemas.microsoft.com/office/drawing/2014/main" id="{32E20C04-3750-6D1E-2600-6631B8D8C9BD}"/>
+                <a16:creationId xmlns:a16="http://schemas.microsoft.com/office/drawing/2014/main" id="{9F1BB273-B87D-A257-36FA-C945AEE6EA28}"/>
               </a:ext>
             </a:extLst>
           </p:cNvPr>
@@ -4863,7 +5059,7 @@
           <p:cNvPr id="9" name="Grafik 8">
             <a:extLst>
               <a:ext uri="{FF2B5EF4-FFF2-40B4-BE49-F238E27FC236}">
-                <a16:creationId xmlns:a16="http://schemas.microsoft.com/office/drawing/2014/main" id="{098E9A9F-1EAE-60F2-22E0-C2ADACC9C185}"/>
+                <a16:creationId xmlns:a16="http://schemas.microsoft.com/office/drawing/2014/main" id="{3B6830F7-E1D0-8C8F-AB4C-DB1FED8FB3C4}"/>
               </a:ext>
             </a:extLst>
           </p:cNvPr>
@@ -4893,7 +5089,7 @@
           <p:cNvPr id="10" name="Grafik 9">
             <a:extLst>
               <a:ext uri="{FF2B5EF4-FFF2-40B4-BE49-F238E27FC236}">
-                <a16:creationId xmlns:a16="http://schemas.microsoft.com/office/drawing/2014/main" id="{7C714DED-50F1-4111-BED4-3EE1EC536637}"/>
+                <a16:creationId xmlns:a16="http://schemas.microsoft.com/office/drawing/2014/main" id="{6AE9F93F-7E70-37D7-A0DF-67BD857A95B3}"/>
               </a:ext>
             </a:extLst>
           </p:cNvPr>
@@ -4923,7 +5119,7 @@
           <p:cNvPr id="11" name="Grafik 10">
             <a:extLst>
               <a:ext uri="{FF2B5EF4-FFF2-40B4-BE49-F238E27FC236}">
-                <a16:creationId xmlns:a16="http://schemas.microsoft.com/office/drawing/2014/main" id="{4916D5E4-32D7-2DDC-4E77-8F4435383471}"/>
+                <a16:creationId xmlns:a16="http://schemas.microsoft.com/office/drawing/2014/main" id="{97D5F067-4B09-02FB-8484-F6DDB1FB1299}"/>
               </a:ext>
             </a:extLst>
           </p:cNvPr>
@@ -4953,7 +5149,7 @@
           <p:cNvPr id="13" name="Grafik 12">
             <a:extLst>
               <a:ext uri="{FF2B5EF4-FFF2-40B4-BE49-F238E27FC236}">
-                <a16:creationId xmlns:a16="http://schemas.microsoft.com/office/drawing/2014/main" id="{D6E1D6B7-AC0A-14C3-A827-845EBE967E6F}"/>
+                <a16:creationId xmlns:a16="http://schemas.microsoft.com/office/drawing/2014/main" id="{28086745-7459-630F-362A-9094BB05E664}"/>
               </a:ext>
             </a:extLst>
           </p:cNvPr>
@@ -4983,7 +5179,7 @@
           <p:cNvPr id="14" name="Grafik 13">
             <a:extLst>
               <a:ext uri="{FF2B5EF4-FFF2-40B4-BE49-F238E27FC236}">
-                <a16:creationId xmlns:a16="http://schemas.microsoft.com/office/drawing/2014/main" id="{439F7F54-2CBF-E657-AF20-F264D8289D6E}"/>
+                <a16:creationId xmlns:a16="http://schemas.microsoft.com/office/drawing/2014/main" id="{EC4F25DE-9B62-370B-06EE-276A71513C54}"/>
               </a:ext>
             </a:extLst>
           </p:cNvPr>
@@ -5013,7 +5209,7 @@
           <p:cNvPr id="16" name="Grafik 15">
             <a:extLst>
               <a:ext uri="{FF2B5EF4-FFF2-40B4-BE49-F238E27FC236}">
-                <a16:creationId xmlns:a16="http://schemas.microsoft.com/office/drawing/2014/main" id="{3C24D215-4606-1B4E-E59F-D423FA60BFF4}"/>
+                <a16:creationId xmlns:a16="http://schemas.microsoft.com/office/drawing/2014/main" id="{8C482E5F-FBEB-7BF2-279D-1895AE8DAC4D}"/>
               </a:ext>
             </a:extLst>
           </p:cNvPr>
@@ -5043,7 +5239,7 @@
           <p:cNvPr id="17" name="Grafik 16">
             <a:extLst>
               <a:ext uri="{FF2B5EF4-FFF2-40B4-BE49-F238E27FC236}">
-                <a16:creationId xmlns:a16="http://schemas.microsoft.com/office/drawing/2014/main" id="{05A53712-BC8A-93FD-1018-40F60BFDF921}"/>
+                <a16:creationId xmlns:a16="http://schemas.microsoft.com/office/drawing/2014/main" id="{49720754-B0B6-05D3-0C0B-BCA7B0BA12E7}"/>
               </a:ext>
             </a:extLst>
           </p:cNvPr>
@@ -5068,583 +5264,146 @@
           </a:prstGeom>
         </p:spPr>
       </p:pic>
-      <p:pic>
-        <p:nvPicPr>
-          <p:cNvPr id="1026" name="Picture 2" descr="Ungleich Zeichen | Tastenkombination Mac Tastatur">
-            <a:extLst>
-              <a:ext uri="{FF2B5EF4-FFF2-40B4-BE49-F238E27FC236}">
-                <a16:creationId xmlns:a16="http://schemas.microsoft.com/office/drawing/2014/main" id="{62F7E931-A0A4-C5D6-6A97-2FD63F64E67F}"/>
-              </a:ext>
-            </a:extLst>
-          </p:cNvPr>
-          <p:cNvPicPr>
-            <a:picLocks noChangeAspect="1" noChangeArrowheads="1"/>
-          </p:cNvPicPr>
+      <p:grpSp>
+        <p:nvGrpSpPr>
+          <p:cNvPr id="4" name="Gruppieren 3">
+            <a:extLst>
+              <a:ext uri="{FF2B5EF4-FFF2-40B4-BE49-F238E27FC236}">
+                <a16:creationId xmlns:a16="http://schemas.microsoft.com/office/drawing/2014/main" id="{D3758C8D-8FB9-A3B9-5E65-0669CEE9EF7E}"/>
+              </a:ext>
+            </a:extLst>
+          </p:cNvPr>
+          <p:cNvGrpSpPr/>
           <p:nvPr/>
-        </p:nvPicPr>
-        <p:blipFill>
-          <a:blip r:embed="rId7">
-            <a:extLst>
-              <a:ext uri="{28A0092B-C50C-407E-A947-70E740481C1C}">
-                <a14:useLocalDpi xmlns:a14="http://schemas.microsoft.com/office/drawing/2010/main" val="0"/>
-              </a:ext>
-            </a:extLst>
-          </a:blip>
-          <a:srcRect/>
-          <a:stretch>
-            <a:fillRect/>
-          </a:stretch>
-        </p:blipFill>
-        <p:spPr bwMode="auto">
-          <a:xfrm>
-            <a:off x="5523192" y="2988316"/>
-            <a:ext cx="1412240" cy="1412240"/>
-          </a:xfrm>
-          <a:prstGeom prst="rect">
-            <a:avLst/>
-          </a:prstGeom>
-          <a:noFill/>
-          <a:extLst>
-            <a:ext uri="{909E8E84-426E-40DD-AFC4-6F175D3DCCD1}">
-              <a14:hiddenFill xmlns:a14="http://schemas.microsoft.com/office/drawing/2010/main">
-                <a:solidFill>
-                  <a:srgbClr val="FFFFFF"/>
-                </a:solidFill>
-              </a14:hiddenFill>
-            </a:ext>
-          </a:extLst>
-        </p:spPr>
-      </p:pic>
-      <p:sp>
-        <p:nvSpPr>
-          <p:cNvPr id="18" name="Textfeld 17">
-            <a:extLst>
-              <a:ext uri="{FF2B5EF4-FFF2-40B4-BE49-F238E27FC236}">
-                <a16:creationId xmlns:a16="http://schemas.microsoft.com/office/drawing/2014/main" id="{714BBA84-2665-3969-CDC9-D246CDDAF1C6}"/>
-              </a:ext>
-            </a:extLst>
-          </p:cNvPr>
-          <p:cNvSpPr txBox="1"/>
-          <p:nvPr/>
-        </p:nvSpPr>
-        <p:spPr>
+        </p:nvGrpSpPr>
+        <p:grpSpPr>
           <a:xfrm>
             <a:off x="3468485" y="2681206"/>
-            <a:ext cx="2694127" cy="369332"/>
+            <a:ext cx="5673980" cy="1719350"/>
+            <a:chOff x="3468485" y="2681206"/>
+            <a:chExt cx="5673980" cy="1719350"/>
           </a:xfrm>
-          <a:prstGeom prst="rect">
-            <a:avLst/>
-          </a:prstGeom>
-          <a:noFill/>
-        </p:spPr>
-        <p:txBody>
-          <a:bodyPr wrap="square" rtlCol="0">
-            <a:spAutoFit/>
-          </a:bodyPr>
-          <a:lstStyle/>
-          <a:p>
-            <a:pPr algn="ctr"/>
-            <a:r>
-              <a:rPr lang="de-DE" dirty="0"/>
-              <a:t>„Schrippe“</a:t>
-            </a:r>
-          </a:p>
-        </p:txBody>
-      </p:sp>
-      <p:sp>
-        <p:nvSpPr>
-          <p:cNvPr id="19" name="Textfeld 18">
-            <a:extLst>
-              <a:ext uri="{FF2B5EF4-FFF2-40B4-BE49-F238E27FC236}">
-                <a16:creationId xmlns:a16="http://schemas.microsoft.com/office/drawing/2014/main" id="{F66D5BFD-0E45-5A8F-2926-5D10BFB369F5}"/>
-              </a:ext>
-            </a:extLst>
-          </p:cNvPr>
-          <p:cNvSpPr txBox="1"/>
-          <p:nvPr/>
-        </p:nvSpPr>
-        <p:spPr>
-          <a:xfrm>
-            <a:off x="6448338" y="2681206"/>
-            <a:ext cx="2694127" cy="369332"/>
-          </a:xfrm>
-          <a:prstGeom prst="rect">
-            <a:avLst/>
-          </a:prstGeom>
-          <a:noFill/>
-        </p:spPr>
-        <p:txBody>
-          <a:bodyPr wrap="square" rtlCol="0">
-            <a:spAutoFit/>
-          </a:bodyPr>
-          <a:lstStyle/>
-          <a:p>
-            <a:pPr algn="ctr"/>
-            <a:r>
-              <a:rPr lang="de-DE" dirty="0"/>
-              <a:t>„Brötchen“</a:t>
-            </a:r>
-          </a:p>
-        </p:txBody>
-      </p:sp>
-      <p:sp>
-        <p:nvSpPr>
-          <p:cNvPr id="20" name="Textfeld 19">
-            <a:extLst>
-              <a:ext uri="{FF2B5EF4-FFF2-40B4-BE49-F238E27FC236}">
-                <a16:creationId xmlns:a16="http://schemas.microsoft.com/office/drawing/2014/main" id="{2AC2B2B0-B5B5-3A0B-9C96-63F1AA0BD74B}"/>
-              </a:ext>
-            </a:extLst>
-          </p:cNvPr>
-          <p:cNvSpPr txBox="1"/>
-          <p:nvPr/>
-        </p:nvSpPr>
-        <p:spPr>
-          <a:xfrm>
-            <a:off x="871443" y="1352461"/>
-            <a:ext cx="8156977" cy="400110"/>
-          </a:xfrm>
-          <a:prstGeom prst="rect">
-            <a:avLst/>
-          </a:prstGeom>
-          <a:noFill/>
-        </p:spPr>
-        <p:txBody>
-          <a:bodyPr wrap="none" rtlCol="0">
-            <a:spAutoFit/>
-          </a:bodyPr>
-          <a:lstStyle/>
-          <a:p>
-            <a:r>
-              <a:rPr lang="de-DE" sz="2000" dirty="0"/>
-              <a:t>Anforderungen des Bauherrn treffen optimierten Workflow des Planers</a:t>
-            </a:r>
-          </a:p>
-        </p:txBody>
-      </p:sp>
-    </p:spTree>
-    <p:extLst>
-      <p:ext uri="{BB962C8B-B14F-4D97-AF65-F5344CB8AC3E}">
-        <p14:creationId xmlns:p14="http://schemas.microsoft.com/office/powerpoint/2010/main" val="521398904"/>
-      </p:ext>
-    </p:extLst>
-  </p:cSld>
-  <p:clrMapOvr>
-    <a:masterClrMapping/>
-  </p:clrMapOvr>
-</p:sld>
-</file>
-
-<file path=ppt/slides/slide5.xml><?xml version="1.0" encoding="utf-8"?>
-<p:sld xmlns:a="http://schemas.openxmlformats.org/drawingml/2006/main" xmlns:r="http://schemas.openxmlformats.org/officeDocument/2006/relationships" xmlns:p="http://schemas.openxmlformats.org/presentationml/2006/main">
-  <p:cSld>
-    <p:spTree>
-      <p:nvGrpSpPr>
-        <p:cNvPr id="1" name="">
-          <a:extLst>
-            <a:ext uri="{FF2B5EF4-FFF2-40B4-BE49-F238E27FC236}">
-              <a16:creationId xmlns:a16="http://schemas.microsoft.com/office/drawing/2014/main" id="{1B9A40D4-63CE-8B7D-4FA6-3916EDCEBD53}"/>
-            </a:ext>
-          </a:extLst>
-        </p:cNvPr>
-        <p:cNvGrpSpPr/>
-        <p:nvPr/>
-      </p:nvGrpSpPr>
-      <p:grpSpPr>
-        <a:xfrm>
-          <a:off x="0" y="0"/>
-          <a:ext cx="0" cy="0"/>
-          <a:chOff x="0" y="0"/>
-          <a:chExt cx="0" cy="0"/>
-        </a:xfrm>
-      </p:grpSpPr>
-      <p:sp>
-        <p:nvSpPr>
-          <p:cNvPr id="2" name="Titel 1">
-            <a:extLst>
-              <a:ext uri="{FF2B5EF4-FFF2-40B4-BE49-F238E27FC236}">
-                <a16:creationId xmlns:a16="http://schemas.microsoft.com/office/drawing/2014/main" id="{3F935689-A6D1-5296-8EC6-43DC980549FA}"/>
-              </a:ext>
-            </a:extLst>
-          </p:cNvPr>
-          <p:cNvSpPr>
-            <a:spLocks noGrp="1"/>
-          </p:cNvSpPr>
-          <p:nvPr>
-            <p:ph type="title"/>
-          </p:nvPr>
-        </p:nvSpPr>
-        <p:spPr/>
-        <p:txBody>
-          <a:bodyPr/>
-          <a:lstStyle/>
-          <a:p>
-            <a:r>
-              <a:rPr lang="de-DE" sz="4000" b="1" dirty="0"/>
-              <a:t>Challenge des Planers</a:t>
-            </a:r>
-          </a:p>
-        </p:txBody>
-      </p:sp>
-      <p:pic>
-        <p:nvPicPr>
-          <p:cNvPr id="7" name="Grafik 6">
-            <a:extLst>
-              <a:ext uri="{FF2B5EF4-FFF2-40B4-BE49-F238E27FC236}">
-                <a16:creationId xmlns:a16="http://schemas.microsoft.com/office/drawing/2014/main" id="{9F1BB273-B87D-A257-36FA-C945AEE6EA28}"/>
-              </a:ext>
-            </a:extLst>
-          </p:cNvPr>
-          <p:cNvPicPr>
-            <a:picLocks noChangeAspect="1"/>
-          </p:cNvPicPr>
-          <p:nvPr/>
-        </p:nvPicPr>
-        <p:blipFill>
-          <a:blip r:embed="rId2"/>
-          <a:stretch>
-            <a:fillRect/>
-          </a:stretch>
-        </p:blipFill>
-        <p:spPr>
-          <a:xfrm>
-            <a:off x="685800" y="2209702"/>
-            <a:ext cx="2568163" cy="2270957"/>
-          </a:xfrm>
-          <a:prstGeom prst="rect">
-            <a:avLst/>
-          </a:prstGeom>
-        </p:spPr>
-      </p:pic>
-      <p:pic>
-        <p:nvPicPr>
-          <p:cNvPr id="9" name="Grafik 8">
-            <a:extLst>
-              <a:ext uri="{FF2B5EF4-FFF2-40B4-BE49-F238E27FC236}">
-                <a16:creationId xmlns:a16="http://schemas.microsoft.com/office/drawing/2014/main" id="{3B6830F7-E1D0-8C8F-AB4C-DB1FED8FB3C4}"/>
-              </a:ext>
-            </a:extLst>
-          </p:cNvPr>
-          <p:cNvPicPr>
-            <a:picLocks noChangeAspect="1"/>
-          </p:cNvPicPr>
-          <p:nvPr/>
-        </p:nvPicPr>
-        <p:blipFill>
-          <a:blip r:embed="rId3"/>
-          <a:stretch>
-            <a:fillRect/>
-          </a:stretch>
-        </p:blipFill>
-        <p:spPr>
-          <a:xfrm>
-            <a:off x="9540083" y="2402742"/>
-            <a:ext cx="1813717" cy="2255715"/>
-          </a:xfrm>
-          <a:prstGeom prst="rect">
-            <a:avLst/>
-          </a:prstGeom>
-        </p:spPr>
-      </p:pic>
-      <p:pic>
-        <p:nvPicPr>
-          <p:cNvPr id="10" name="Grafik 9">
-            <a:extLst>
-              <a:ext uri="{FF2B5EF4-FFF2-40B4-BE49-F238E27FC236}">
-                <a16:creationId xmlns:a16="http://schemas.microsoft.com/office/drawing/2014/main" id="{6AE9F93F-7E70-37D7-A0DF-67BD857A95B3}"/>
-              </a:ext>
-            </a:extLst>
-          </p:cNvPr>
-          <p:cNvPicPr>
-            <a:picLocks noChangeAspect="1"/>
-          </p:cNvPicPr>
-          <p:nvPr/>
-        </p:nvPicPr>
-        <p:blipFill>
-          <a:blip r:embed="rId4"/>
-          <a:stretch>
-            <a:fillRect/>
-          </a:stretch>
-        </p:blipFill>
-        <p:spPr>
-          <a:xfrm>
-            <a:off x="4334470" y="3185123"/>
-            <a:ext cx="922100" cy="853514"/>
-          </a:xfrm>
-          <a:prstGeom prst="rect">
-            <a:avLst/>
-          </a:prstGeom>
-        </p:spPr>
-      </p:pic>
-      <p:pic>
-        <p:nvPicPr>
-          <p:cNvPr id="11" name="Grafik 10">
-            <a:extLst>
-              <a:ext uri="{FF2B5EF4-FFF2-40B4-BE49-F238E27FC236}">
-                <a16:creationId xmlns:a16="http://schemas.microsoft.com/office/drawing/2014/main" id="{97D5F067-4B09-02FB-8484-F6DDB1FB1299}"/>
-              </a:ext>
-            </a:extLst>
-          </p:cNvPr>
-          <p:cNvPicPr>
-            <a:picLocks noChangeAspect="1"/>
-          </p:cNvPicPr>
-          <p:nvPr/>
-        </p:nvPicPr>
-        <p:blipFill>
-          <a:blip r:embed="rId4"/>
-          <a:stretch>
-            <a:fillRect/>
-          </a:stretch>
-        </p:blipFill>
-        <p:spPr>
-          <a:xfrm>
-            <a:off x="7240230" y="3185123"/>
-            <a:ext cx="922100" cy="853514"/>
-          </a:xfrm>
-          <a:prstGeom prst="rect">
-            <a:avLst/>
-          </a:prstGeom>
-        </p:spPr>
-      </p:pic>
-      <p:pic>
-        <p:nvPicPr>
-          <p:cNvPr id="13" name="Grafik 12">
-            <a:extLst>
-              <a:ext uri="{FF2B5EF4-FFF2-40B4-BE49-F238E27FC236}">
-                <a16:creationId xmlns:a16="http://schemas.microsoft.com/office/drawing/2014/main" id="{28086745-7459-630F-362A-9094BB05E664}"/>
-              </a:ext>
-            </a:extLst>
-          </p:cNvPr>
-          <p:cNvPicPr>
-            <a:picLocks noChangeAspect="1"/>
-          </p:cNvPicPr>
-          <p:nvPr/>
-        </p:nvPicPr>
-        <p:blipFill>
-          <a:blip r:embed="rId5"/>
-          <a:stretch>
-            <a:fillRect/>
-          </a:stretch>
-        </p:blipFill>
-        <p:spPr>
-          <a:xfrm>
-            <a:off x="3468485" y="3606800"/>
-            <a:ext cx="777307" cy="175275"/>
-          </a:xfrm>
-          <a:prstGeom prst="rect">
-            <a:avLst/>
-          </a:prstGeom>
-        </p:spPr>
-      </p:pic>
-      <p:pic>
-        <p:nvPicPr>
-          <p:cNvPr id="14" name="Grafik 13">
-            <a:extLst>
-              <a:ext uri="{FF2B5EF4-FFF2-40B4-BE49-F238E27FC236}">
-                <a16:creationId xmlns:a16="http://schemas.microsoft.com/office/drawing/2014/main" id="{EC4F25DE-9B62-370B-06EE-276A71513C54}"/>
-              </a:ext>
-            </a:extLst>
-          </p:cNvPr>
-          <p:cNvPicPr>
-            <a:picLocks noChangeAspect="1"/>
-          </p:cNvPicPr>
-          <p:nvPr/>
-        </p:nvPicPr>
-        <p:blipFill>
-          <a:blip r:embed="rId5"/>
-          <a:stretch>
-            <a:fillRect/>
-          </a:stretch>
-        </p:blipFill>
-        <p:spPr>
-          <a:xfrm rot="10800000">
-            <a:off x="8340633" y="3606799"/>
-            <a:ext cx="777307" cy="175275"/>
-          </a:xfrm>
-          <a:prstGeom prst="rect">
-            <a:avLst/>
-          </a:prstGeom>
-        </p:spPr>
-      </p:pic>
-      <p:pic>
-        <p:nvPicPr>
-          <p:cNvPr id="16" name="Grafik 15">
-            <a:extLst>
-              <a:ext uri="{FF2B5EF4-FFF2-40B4-BE49-F238E27FC236}">
-                <a16:creationId xmlns:a16="http://schemas.microsoft.com/office/drawing/2014/main" id="{8C482E5F-FBEB-7BF2-279D-1895AE8DAC4D}"/>
-              </a:ext>
-            </a:extLst>
-          </p:cNvPr>
-          <p:cNvPicPr>
-            <a:picLocks noChangeAspect="1"/>
-          </p:cNvPicPr>
-          <p:nvPr/>
-        </p:nvPicPr>
-        <p:blipFill>
-          <a:blip r:embed="rId6"/>
-          <a:stretch>
-            <a:fillRect/>
-          </a:stretch>
-        </p:blipFill>
-        <p:spPr>
-          <a:xfrm>
-            <a:off x="4028715" y="4136379"/>
-            <a:ext cx="1533610" cy="344280"/>
-          </a:xfrm>
-          <a:prstGeom prst="rect">
-            <a:avLst/>
-          </a:prstGeom>
-        </p:spPr>
-      </p:pic>
-      <p:pic>
-        <p:nvPicPr>
-          <p:cNvPr id="17" name="Grafik 16">
-            <a:extLst>
-              <a:ext uri="{FF2B5EF4-FFF2-40B4-BE49-F238E27FC236}">
-                <a16:creationId xmlns:a16="http://schemas.microsoft.com/office/drawing/2014/main" id="{49720754-B0B6-05D3-0C0B-BCA7B0BA12E7}"/>
-              </a:ext>
-            </a:extLst>
-          </p:cNvPr>
-          <p:cNvPicPr>
-            <a:picLocks noChangeAspect="1"/>
-          </p:cNvPicPr>
-          <p:nvPr/>
-        </p:nvPicPr>
-        <p:blipFill>
-          <a:blip r:embed="rId6"/>
-          <a:stretch>
-            <a:fillRect/>
-          </a:stretch>
-        </p:blipFill>
-        <p:spPr>
-          <a:xfrm>
-            <a:off x="7028597" y="4136379"/>
-            <a:ext cx="1533610" cy="344280"/>
-          </a:xfrm>
-          <a:prstGeom prst="rect">
-            <a:avLst/>
-          </a:prstGeom>
-        </p:spPr>
-      </p:pic>
-      <p:pic>
-        <p:nvPicPr>
-          <p:cNvPr id="1026" name="Picture 2" descr="Ungleich Zeichen | Tastenkombination Mac Tastatur">
-            <a:extLst>
-              <a:ext uri="{FF2B5EF4-FFF2-40B4-BE49-F238E27FC236}">
-                <a16:creationId xmlns:a16="http://schemas.microsoft.com/office/drawing/2014/main" id="{93A12267-E34C-E22E-CCE9-6E035469214A}"/>
-              </a:ext>
-            </a:extLst>
-          </p:cNvPr>
-          <p:cNvPicPr>
-            <a:picLocks noChangeAspect="1" noChangeArrowheads="1"/>
-          </p:cNvPicPr>
-          <p:nvPr/>
-        </p:nvPicPr>
-        <p:blipFill>
-          <a:blip r:embed="rId7">
-            <a:extLst>
-              <a:ext uri="{28A0092B-C50C-407E-A947-70E740481C1C}">
-                <a14:useLocalDpi xmlns:a14="http://schemas.microsoft.com/office/drawing/2010/main" val="0"/>
-              </a:ext>
-            </a:extLst>
-          </a:blip>
-          <a:srcRect/>
-          <a:stretch>
-            <a:fillRect/>
-          </a:stretch>
-        </p:blipFill>
-        <p:spPr bwMode="auto">
-          <a:xfrm>
-            <a:off x="5523192" y="2988316"/>
-            <a:ext cx="1412240" cy="1412240"/>
-          </a:xfrm>
-          <a:prstGeom prst="rect">
-            <a:avLst/>
-          </a:prstGeom>
-          <a:noFill/>
-          <a:extLst>
-            <a:ext uri="{909E8E84-426E-40DD-AFC4-6F175D3DCCD1}">
-              <a14:hiddenFill xmlns:a14="http://schemas.microsoft.com/office/drawing/2010/main">
-                <a:solidFill>
-                  <a:srgbClr val="FFFFFF"/>
-                </a:solidFill>
-              </a14:hiddenFill>
-            </a:ext>
-          </a:extLst>
-        </p:spPr>
-      </p:pic>
-      <p:sp>
-        <p:nvSpPr>
-          <p:cNvPr id="18" name="Textfeld 17">
-            <a:extLst>
-              <a:ext uri="{FF2B5EF4-FFF2-40B4-BE49-F238E27FC236}">
-                <a16:creationId xmlns:a16="http://schemas.microsoft.com/office/drawing/2014/main" id="{76BB9FEC-6593-9447-1D6B-3544C51AA5B9}"/>
-              </a:ext>
-            </a:extLst>
-          </p:cNvPr>
-          <p:cNvSpPr txBox="1"/>
-          <p:nvPr/>
-        </p:nvSpPr>
-        <p:spPr>
-          <a:xfrm>
-            <a:off x="3468485" y="2681206"/>
-            <a:ext cx="2694127" cy="369332"/>
-          </a:xfrm>
-          <a:prstGeom prst="rect">
-            <a:avLst/>
-          </a:prstGeom>
-          <a:noFill/>
-        </p:spPr>
-        <p:txBody>
-          <a:bodyPr wrap="square" rtlCol="0">
-            <a:spAutoFit/>
-          </a:bodyPr>
-          <a:lstStyle/>
-          <a:p>
-            <a:pPr algn="ctr"/>
-            <a:r>
-              <a:rPr lang="de-DE" dirty="0"/>
-              <a:t>„Schrippe“</a:t>
-            </a:r>
-          </a:p>
-        </p:txBody>
-      </p:sp>
-      <p:sp>
-        <p:nvSpPr>
-          <p:cNvPr id="19" name="Textfeld 18">
-            <a:extLst>
-              <a:ext uri="{FF2B5EF4-FFF2-40B4-BE49-F238E27FC236}">
-                <a16:creationId xmlns:a16="http://schemas.microsoft.com/office/drawing/2014/main" id="{EE781DFB-C13D-2A8A-C3E4-2C024AA48347}"/>
-              </a:ext>
-            </a:extLst>
-          </p:cNvPr>
-          <p:cNvSpPr txBox="1"/>
-          <p:nvPr/>
-        </p:nvSpPr>
-        <p:spPr>
-          <a:xfrm>
-            <a:off x="6448338" y="2681206"/>
-            <a:ext cx="2694127" cy="369332"/>
-          </a:xfrm>
-          <a:prstGeom prst="rect">
-            <a:avLst/>
-          </a:prstGeom>
-          <a:noFill/>
-        </p:spPr>
-        <p:txBody>
-          <a:bodyPr wrap="square" rtlCol="0">
-            <a:spAutoFit/>
-          </a:bodyPr>
-          <a:lstStyle/>
-          <a:p>
-            <a:pPr algn="ctr"/>
-            <a:r>
-              <a:rPr lang="de-DE" dirty="0"/>
-              <a:t>„Brötchen“</a:t>
-            </a:r>
-          </a:p>
-        </p:txBody>
-      </p:sp>
+        </p:grpSpPr>
+        <p:pic>
+          <p:nvPicPr>
+            <p:cNvPr id="1026" name="Picture 2" descr="Ungleich Zeichen | Tastenkombination Mac Tastatur">
+              <a:extLst>
+                <a:ext uri="{FF2B5EF4-FFF2-40B4-BE49-F238E27FC236}">
+                  <a16:creationId xmlns:a16="http://schemas.microsoft.com/office/drawing/2014/main" id="{93A12267-E34C-E22E-CCE9-6E035469214A}"/>
+                </a:ext>
+              </a:extLst>
+            </p:cNvPr>
+            <p:cNvPicPr>
+              <a:picLocks noChangeAspect="1" noChangeArrowheads="1"/>
+            </p:cNvPicPr>
+            <p:nvPr/>
+          </p:nvPicPr>
+          <p:blipFill>
+            <a:blip r:embed="rId7">
+              <a:extLst>
+                <a:ext uri="{28A0092B-C50C-407E-A947-70E740481C1C}">
+                  <a14:useLocalDpi xmlns:a14="http://schemas.microsoft.com/office/drawing/2010/main" val="0"/>
+                </a:ext>
+              </a:extLst>
+            </a:blip>
+            <a:srcRect/>
+            <a:stretch>
+              <a:fillRect/>
+            </a:stretch>
+          </p:blipFill>
+          <p:spPr bwMode="auto">
+            <a:xfrm>
+              <a:off x="5523192" y="2988316"/>
+              <a:ext cx="1412240" cy="1412240"/>
+            </a:xfrm>
+            <a:prstGeom prst="rect">
+              <a:avLst/>
+            </a:prstGeom>
+            <a:noFill/>
+            <a:extLst>
+              <a:ext uri="{909E8E84-426E-40DD-AFC4-6F175D3DCCD1}">
+                <a14:hiddenFill xmlns:a14="http://schemas.microsoft.com/office/drawing/2010/main">
+                  <a:solidFill>
+                    <a:srgbClr val="FFFFFF"/>
+                  </a:solidFill>
+                </a14:hiddenFill>
+              </a:ext>
+            </a:extLst>
+          </p:spPr>
+        </p:pic>
+        <p:sp>
+          <p:nvSpPr>
+            <p:cNvPr id="18" name="Textfeld 17">
+              <a:extLst>
+                <a:ext uri="{FF2B5EF4-FFF2-40B4-BE49-F238E27FC236}">
+                  <a16:creationId xmlns:a16="http://schemas.microsoft.com/office/drawing/2014/main" id="{76BB9FEC-6593-9447-1D6B-3544C51AA5B9}"/>
+                </a:ext>
+              </a:extLst>
+            </p:cNvPr>
+            <p:cNvSpPr txBox="1"/>
+            <p:nvPr/>
+          </p:nvSpPr>
+          <p:spPr>
+            <a:xfrm>
+              <a:off x="3468485" y="2681206"/>
+              <a:ext cx="2694127" cy="369332"/>
+            </a:xfrm>
+            <a:prstGeom prst="rect">
+              <a:avLst/>
+            </a:prstGeom>
+            <a:noFill/>
+          </p:spPr>
+          <p:txBody>
+            <a:bodyPr wrap="square" rtlCol="0">
+              <a:spAutoFit/>
+            </a:bodyPr>
+            <a:lstStyle/>
+            <a:p>
+              <a:pPr algn="ctr"/>
+              <a:r>
+                <a:rPr lang="de-DE"/>
+                <a:t>„Schrippe“</a:t>
+              </a:r>
+            </a:p>
+          </p:txBody>
+        </p:sp>
+        <p:sp>
+          <p:nvSpPr>
+            <p:cNvPr id="19" name="Textfeld 18">
+              <a:extLst>
+                <a:ext uri="{FF2B5EF4-FFF2-40B4-BE49-F238E27FC236}">
+                  <a16:creationId xmlns:a16="http://schemas.microsoft.com/office/drawing/2014/main" id="{EE781DFB-C13D-2A8A-C3E4-2C024AA48347}"/>
+                </a:ext>
+              </a:extLst>
+            </p:cNvPr>
+            <p:cNvSpPr txBox="1"/>
+            <p:nvPr/>
+          </p:nvSpPr>
+          <p:spPr>
+            <a:xfrm>
+              <a:off x="6448338" y="2681206"/>
+              <a:ext cx="2694127" cy="369332"/>
+            </a:xfrm>
+            <a:prstGeom prst="rect">
+              <a:avLst/>
+            </a:prstGeom>
+            <a:noFill/>
+          </p:spPr>
+          <p:txBody>
+            <a:bodyPr wrap="square" rtlCol="0">
+              <a:spAutoFit/>
+            </a:bodyPr>
+            <a:lstStyle/>
+            <a:p>
+              <a:pPr algn="ctr"/>
+              <a:r>
+                <a:rPr lang="de-DE"/>
+                <a:t>„Brötchen“</a:t>
+              </a:r>
+            </a:p>
+          </p:txBody>
+        </p:sp>
+      </p:grpSp>
       <p:sp>
         <p:nvSpPr>
           <p:cNvPr id="20" name="Textfeld 19">
@@ -5674,7 +5433,7 @@
           <a:lstStyle/>
           <a:p>
             <a:r>
-              <a:rPr lang="de-DE" sz="2000" dirty="0"/>
+              <a:rPr lang="de-DE" sz="2000"/>
               <a:t>Anforderungen des Bauherrn treffen optimierten Workflow des Planers</a:t>
             </a:r>
           </a:p>
@@ -5710,7 +5469,7 @@
           <a:p>
             <a:pPr algn="ctr"/>
             <a:r>
-              <a:rPr lang="de-DE" sz="3200" b="1" dirty="0">
+              <a:rPr lang="de-DE" sz="3200" b="1">
                 <a:solidFill>
                   <a:srgbClr val="C00000"/>
                 </a:solidFill>
@@ -5718,19 +5477,54 @@
               <a:t>Aufgabe: Toolunterstützung zur Überführung </a:t>
             </a:r>
             <a:br>
-              <a:rPr lang="de-DE" sz="3200" b="1" dirty="0">
+              <a:rPr lang="de-DE" sz="3200" b="1">
                 <a:solidFill>
                   <a:srgbClr val="C00000"/>
                 </a:solidFill>
               </a:rPr>
             </a:br>
             <a:r>
-              <a:rPr lang="de-DE" sz="3200" b="1" dirty="0">
+              <a:rPr lang="de-DE" sz="3200" b="1">
                 <a:solidFill>
                   <a:srgbClr val="C00000"/>
                 </a:solidFill>
               </a:rPr>
               <a:t>Planer-BIM zu AIA-BIM </a:t>
+            </a:r>
+          </a:p>
+        </p:txBody>
+      </p:sp>
+      <p:sp>
+        <p:nvSpPr>
+          <p:cNvPr id="5" name="Textfeld 4">
+            <a:extLst>
+              <a:ext uri="{FF2B5EF4-FFF2-40B4-BE49-F238E27FC236}">
+                <a16:creationId xmlns:a16="http://schemas.microsoft.com/office/drawing/2014/main" id="{D5349398-2FDF-50C5-F152-40FAADD6CDF6}"/>
+              </a:ext>
+            </a:extLst>
+          </p:cNvPr>
+          <p:cNvSpPr txBox="1"/>
+          <p:nvPr/>
+        </p:nvSpPr>
+        <p:spPr>
+          <a:xfrm>
+            <a:off x="3390868" y="6492875"/>
+            <a:ext cx="5410264" cy="338554"/>
+          </a:xfrm>
+          <a:prstGeom prst="rect">
+            <a:avLst/>
+          </a:prstGeom>
+          <a:noFill/>
+        </p:spPr>
+        <p:txBody>
+          <a:bodyPr wrap="none" rtlCol="0">
+            <a:spAutoFit/>
+          </a:bodyPr>
+          <a:lstStyle/>
+          <a:p>
+            <a:r>
+              <a:rPr lang="de-DE" sz="1600"/>
+              <a:t>Team Bonsai – Hackathon zum BIM-Portal des Bundes 2025</a:t>
             </a:r>
           </a:p>
         </p:txBody>
@@ -5745,10 +5539,149 @@
   <p:clrMapOvr>
     <a:masterClrMapping/>
   </p:clrMapOvr>
+  <p:timing>
+    <p:tnLst>
+      <p:par>
+        <p:cTn id="1" dur="indefinite" restart="never" nodeType="tmRoot">
+          <p:childTnLst>
+            <p:seq concurrent="1" nextAc="seek">
+              <p:cTn id="2" dur="indefinite" nodeType="mainSeq">
+                <p:childTnLst>
+                  <p:par>
+                    <p:cTn id="3" fill="hold">
+                      <p:stCondLst>
+                        <p:cond delay="indefinite"/>
+                      </p:stCondLst>
+                      <p:childTnLst>
+                        <p:par>
+                          <p:cTn id="4" fill="hold">
+                            <p:stCondLst>
+                              <p:cond delay="0"/>
+                            </p:stCondLst>
+                            <p:childTnLst>
+                              <p:par>
+                                <p:cTn id="5" presetID="10" presetClass="entr" presetSubtype="0" fill="hold" nodeType="clickEffect">
+                                  <p:stCondLst>
+                                    <p:cond delay="0"/>
+                                  </p:stCondLst>
+                                  <p:childTnLst>
+                                    <p:set>
+                                      <p:cBhvr>
+                                        <p:cTn id="6" dur="1" fill="hold">
+                                          <p:stCondLst>
+                                            <p:cond delay="0"/>
+                                          </p:stCondLst>
+                                        </p:cTn>
+                                        <p:tgtEl>
+                                          <p:spTgt spid="4"/>
+                                        </p:tgtEl>
+                                        <p:attrNameLst>
+                                          <p:attrName>style.visibility</p:attrName>
+                                        </p:attrNameLst>
+                                      </p:cBhvr>
+                                      <p:to>
+                                        <p:strVal val="visible"/>
+                                      </p:to>
+                                    </p:set>
+                                    <p:animEffect transition="in" filter="fade">
+                                      <p:cBhvr>
+                                        <p:cTn id="7" dur="500"/>
+                                        <p:tgtEl>
+                                          <p:spTgt spid="4"/>
+                                        </p:tgtEl>
+                                      </p:cBhvr>
+                                    </p:animEffect>
+                                  </p:childTnLst>
+                                </p:cTn>
+                              </p:par>
+                            </p:childTnLst>
+                          </p:cTn>
+                        </p:par>
+                      </p:childTnLst>
+                    </p:cTn>
+                  </p:par>
+                  <p:par>
+                    <p:cTn id="8" fill="hold">
+                      <p:stCondLst>
+                        <p:cond delay="indefinite"/>
+                      </p:stCondLst>
+                      <p:childTnLst>
+                        <p:par>
+                          <p:cTn id="9" fill="hold">
+                            <p:stCondLst>
+                              <p:cond delay="0"/>
+                            </p:stCondLst>
+                            <p:childTnLst>
+                              <p:par>
+                                <p:cTn id="10" presetID="22" presetClass="entr" presetSubtype="8" fill="hold" grpId="0" nodeType="clickEffect">
+                                  <p:stCondLst>
+                                    <p:cond delay="0"/>
+                                  </p:stCondLst>
+                                  <p:childTnLst>
+                                    <p:set>
+                                      <p:cBhvr>
+                                        <p:cTn id="11" dur="1" fill="hold">
+                                          <p:stCondLst>
+                                            <p:cond delay="0"/>
+                                          </p:stCondLst>
+                                        </p:cTn>
+                                        <p:tgtEl>
+                                          <p:spTgt spid="3"/>
+                                        </p:tgtEl>
+                                        <p:attrNameLst>
+                                          <p:attrName>style.visibility</p:attrName>
+                                        </p:attrNameLst>
+                                      </p:cBhvr>
+                                      <p:to>
+                                        <p:strVal val="visible"/>
+                                      </p:to>
+                                    </p:set>
+                                    <p:animEffect transition="in" filter="wipe(left)">
+                                      <p:cBhvr>
+                                        <p:cTn id="12" dur="500"/>
+                                        <p:tgtEl>
+                                          <p:spTgt spid="3"/>
+                                        </p:tgtEl>
+                                      </p:cBhvr>
+                                    </p:animEffect>
+                                  </p:childTnLst>
+                                </p:cTn>
+                              </p:par>
+                            </p:childTnLst>
+                          </p:cTn>
+                        </p:par>
+                      </p:childTnLst>
+                    </p:cTn>
+                  </p:par>
+                </p:childTnLst>
+              </p:cTn>
+              <p:prevCondLst>
+                <p:cond evt="onPrev" delay="0">
+                  <p:tgtEl>
+                    <p:sldTgt/>
+                  </p:tgtEl>
+                </p:cond>
+              </p:prevCondLst>
+              <p:nextCondLst>
+                <p:cond evt="onNext" delay="0">
+                  <p:tgtEl>
+                    <p:sldTgt/>
+                  </p:tgtEl>
+                </p:cond>
+              </p:nextCondLst>
+            </p:seq>
+          </p:childTnLst>
+        </p:cTn>
+      </p:par>
+    </p:tnLst>
+    <p:bldLst>
+      <p:bldP spid="3" grpId="0"/>
+    </p:bldLst>
+  </p:timing>
 </p:sld>
 </file>
 
-<file path=ppt/slides/slide6.xml><?xml version="1.0" encoding="utf-8"?>
+<file path=ppt/slides/slide5.xml><?xml version="1.0" encoding="utf-8"?>
 <p:sld xmlns:a="http://schemas.openxmlformats.org/drawingml/2006/main" xmlns:r="http://schemas.openxmlformats.org/officeDocument/2006/relationships" xmlns:p="http://schemas.openxmlformats.org/presentationml/2006/main">
   <p:cSld>
     <p:spTree>
@@ -5795,80 +5728,8 @@
           <a:lstStyle/>
           <a:p>
             <a:r>
-              <a:rPr lang="de-DE" sz="4000" b="1" dirty="0"/>
+              <a:rPr lang="de-DE" sz="4000" b="1"/>
               <a:t>Idee</a:t>
-            </a:r>
-          </a:p>
-        </p:txBody>
-      </p:sp>
-      <p:sp>
-        <p:nvSpPr>
-          <p:cNvPr id="18" name="Textfeld 17">
-            <a:extLst>
-              <a:ext uri="{FF2B5EF4-FFF2-40B4-BE49-F238E27FC236}">
-                <a16:creationId xmlns:a16="http://schemas.microsoft.com/office/drawing/2014/main" id="{DE1735CB-2C4C-CEE8-3068-901A82FBFCA8}"/>
-              </a:ext>
-            </a:extLst>
-          </p:cNvPr>
-          <p:cNvSpPr txBox="1"/>
-          <p:nvPr/>
-        </p:nvSpPr>
-        <p:spPr>
-          <a:xfrm>
-            <a:off x="3439304" y="4457284"/>
-            <a:ext cx="2694127" cy="369332"/>
-          </a:xfrm>
-          <a:prstGeom prst="rect">
-            <a:avLst/>
-          </a:prstGeom>
-          <a:noFill/>
-        </p:spPr>
-        <p:txBody>
-          <a:bodyPr wrap="square" rtlCol="0">
-            <a:spAutoFit/>
-          </a:bodyPr>
-          <a:lstStyle/>
-          <a:p>
-            <a:pPr algn="ctr"/>
-            <a:r>
-              <a:rPr lang="de-DE" dirty="0"/>
-              <a:t>IDS-Bauherr</a:t>
-            </a:r>
-          </a:p>
-        </p:txBody>
-      </p:sp>
-      <p:sp>
-        <p:nvSpPr>
-          <p:cNvPr id="19" name="Textfeld 18">
-            <a:extLst>
-              <a:ext uri="{FF2B5EF4-FFF2-40B4-BE49-F238E27FC236}">
-                <a16:creationId xmlns:a16="http://schemas.microsoft.com/office/drawing/2014/main" id="{A34AC8B2-D2A9-1F82-D9B5-84AC1DAC3C07}"/>
-              </a:ext>
-            </a:extLst>
-          </p:cNvPr>
-          <p:cNvSpPr txBox="1"/>
-          <p:nvPr/>
-        </p:nvSpPr>
-        <p:spPr>
-          <a:xfrm>
-            <a:off x="7617877" y="4457284"/>
-            <a:ext cx="2694127" cy="369332"/>
-          </a:xfrm>
-          <a:prstGeom prst="rect">
-            <a:avLst/>
-          </a:prstGeom>
-          <a:noFill/>
-        </p:spPr>
-        <p:txBody>
-          <a:bodyPr wrap="square" rtlCol="0">
-            <a:spAutoFit/>
-          </a:bodyPr>
-          <a:lstStyle/>
-          <a:p>
-            <a:pPr algn="ctr"/>
-            <a:r>
-              <a:rPr lang="de-DE" dirty="0"/>
-              <a:t>IDS-Planer</a:t>
             </a:r>
           </a:p>
         </p:txBody>
@@ -5902,18 +5763,645 @@
           <a:lstStyle/>
           <a:p>
             <a:r>
-              <a:rPr lang="de-DE" sz="2000" dirty="0"/>
+              <a:rPr lang="de-DE" sz="2000"/>
               <a:t>Anforderungen des Bauherrn treffen optimierten Workflow des Planers</a:t>
             </a:r>
           </a:p>
         </p:txBody>
       </p:sp>
-      <p:sp>
-        <p:nvSpPr>
-          <p:cNvPr id="4" name="Textfeld 3">
-            <a:extLst>
-              <a:ext uri="{FF2B5EF4-FFF2-40B4-BE49-F238E27FC236}">
-                <a16:creationId xmlns:a16="http://schemas.microsoft.com/office/drawing/2014/main" id="{E96B6E5E-99A3-6CAB-EEFA-FAA63741310A}"/>
+      <p:grpSp>
+        <p:nvGrpSpPr>
+          <p:cNvPr id="3" name="Gruppieren 2">
+            <a:extLst>
+              <a:ext uri="{FF2B5EF4-FFF2-40B4-BE49-F238E27FC236}">
+                <a16:creationId xmlns:a16="http://schemas.microsoft.com/office/drawing/2014/main" id="{3A4E8D11-13E4-0492-A961-FF5A1738673C}"/>
+              </a:ext>
+            </a:extLst>
+          </p:cNvPr>
+          <p:cNvGrpSpPr/>
+          <p:nvPr/>
+        </p:nvGrpSpPr>
+        <p:grpSpPr>
+          <a:xfrm>
+            <a:off x="838200" y="3408212"/>
+            <a:ext cx="9473804" cy="1302654"/>
+            <a:chOff x="838200" y="3523962"/>
+            <a:chExt cx="9473804" cy="1302654"/>
+          </a:xfrm>
+        </p:grpSpPr>
+        <p:sp>
+          <p:nvSpPr>
+            <p:cNvPr id="18" name="Textfeld 17">
+              <a:extLst>
+                <a:ext uri="{FF2B5EF4-FFF2-40B4-BE49-F238E27FC236}">
+                  <a16:creationId xmlns:a16="http://schemas.microsoft.com/office/drawing/2014/main" id="{DE1735CB-2C4C-CEE8-3068-901A82FBFCA8}"/>
+                </a:ext>
+              </a:extLst>
+            </p:cNvPr>
+            <p:cNvSpPr txBox="1"/>
+            <p:nvPr/>
+          </p:nvSpPr>
+          <p:spPr>
+            <a:xfrm>
+              <a:off x="3439304" y="4457284"/>
+              <a:ext cx="2694127" cy="369332"/>
+            </a:xfrm>
+            <a:prstGeom prst="rect">
+              <a:avLst/>
+            </a:prstGeom>
+            <a:noFill/>
+          </p:spPr>
+          <p:txBody>
+            <a:bodyPr wrap="square" rtlCol="0">
+              <a:spAutoFit/>
+            </a:bodyPr>
+            <a:lstStyle/>
+            <a:p>
+              <a:pPr algn="ctr"/>
+              <a:r>
+                <a:rPr lang="de-DE"/>
+                <a:t>IDS-Bauherr</a:t>
+              </a:r>
+            </a:p>
+          </p:txBody>
+        </p:sp>
+        <p:sp>
+          <p:nvSpPr>
+            <p:cNvPr id="19" name="Textfeld 18">
+              <a:extLst>
+                <a:ext uri="{FF2B5EF4-FFF2-40B4-BE49-F238E27FC236}">
+                  <a16:creationId xmlns:a16="http://schemas.microsoft.com/office/drawing/2014/main" id="{A34AC8B2-D2A9-1F82-D9B5-84AC1DAC3C07}"/>
+                </a:ext>
+              </a:extLst>
+            </p:cNvPr>
+            <p:cNvSpPr txBox="1"/>
+            <p:nvPr/>
+          </p:nvSpPr>
+          <p:spPr>
+            <a:xfrm>
+              <a:off x="7617877" y="4457284"/>
+              <a:ext cx="2694127" cy="369332"/>
+            </a:xfrm>
+            <a:prstGeom prst="rect">
+              <a:avLst/>
+            </a:prstGeom>
+            <a:noFill/>
+          </p:spPr>
+          <p:txBody>
+            <a:bodyPr wrap="square" rtlCol="0">
+              <a:spAutoFit/>
+            </a:bodyPr>
+            <a:lstStyle/>
+            <a:p>
+              <a:pPr algn="ctr"/>
+              <a:r>
+                <a:rPr lang="de-DE"/>
+                <a:t>IDS-Planer</a:t>
+              </a:r>
+            </a:p>
+          </p:txBody>
+        </p:sp>
+        <p:pic>
+          <p:nvPicPr>
+            <p:cNvPr id="24" name="Grafik 23">
+              <a:extLst>
+                <a:ext uri="{FF2B5EF4-FFF2-40B4-BE49-F238E27FC236}">
+                  <a16:creationId xmlns:a16="http://schemas.microsoft.com/office/drawing/2014/main" id="{6241EC17-2A4A-43B2-1315-C043C903D36C}"/>
+                </a:ext>
+              </a:extLst>
+            </p:cNvPr>
+            <p:cNvPicPr>
+              <a:picLocks noChangeAspect="1"/>
+            </p:cNvPicPr>
+            <p:nvPr/>
+          </p:nvPicPr>
+          <p:blipFill>
+            <a:blip r:embed="rId3"/>
+            <a:stretch>
+              <a:fillRect/>
+            </a:stretch>
+          </p:blipFill>
+          <p:spPr>
+            <a:xfrm>
+              <a:off x="4325318" y="3626660"/>
+              <a:ext cx="922100" cy="853514"/>
+            </a:xfrm>
+            <a:prstGeom prst="rect">
+              <a:avLst/>
+            </a:prstGeom>
+          </p:spPr>
+        </p:pic>
+        <p:pic>
+          <p:nvPicPr>
+            <p:cNvPr id="25" name="Grafik 24">
+              <a:extLst>
+                <a:ext uri="{FF2B5EF4-FFF2-40B4-BE49-F238E27FC236}">
+                  <a16:creationId xmlns:a16="http://schemas.microsoft.com/office/drawing/2014/main" id="{DE67A584-7277-B55D-5975-5DE7E44479BF}"/>
+                </a:ext>
+              </a:extLst>
+            </p:cNvPr>
+            <p:cNvPicPr>
+              <a:picLocks noChangeAspect="1"/>
+            </p:cNvPicPr>
+            <p:nvPr/>
+          </p:nvPicPr>
+          <p:blipFill>
+            <a:blip r:embed="rId3"/>
+            <a:stretch>
+              <a:fillRect/>
+            </a:stretch>
+          </p:blipFill>
+          <p:spPr>
+            <a:xfrm>
+              <a:off x="8407903" y="3626660"/>
+              <a:ext cx="922100" cy="853514"/>
+            </a:xfrm>
+            <a:prstGeom prst="rect">
+              <a:avLst/>
+            </a:prstGeom>
+          </p:spPr>
+        </p:pic>
+        <p:sp>
+          <p:nvSpPr>
+            <p:cNvPr id="28" name="Textfeld 27">
+              <a:extLst>
+                <a:ext uri="{FF2B5EF4-FFF2-40B4-BE49-F238E27FC236}">
+                  <a16:creationId xmlns:a16="http://schemas.microsoft.com/office/drawing/2014/main" id="{AEB91BED-E477-D873-BE35-D6D64FC544EB}"/>
+                </a:ext>
+              </a:extLst>
+            </p:cNvPr>
+            <p:cNvSpPr txBox="1"/>
+            <p:nvPr/>
+          </p:nvSpPr>
+          <p:spPr>
+            <a:xfrm>
+              <a:off x="838200" y="3768996"/>
+              <a:ext cx="2570704" cy="523220"/>
+            </a:xfrm>
+            <a:prstGeom prst="rect">
+              <a:avLst/>
+            </a:prstGeom>
+            <a:noFill/>
+          </p:spPr>
+          <p:txBody>
+            <a:bodyPr wrap="none" rtlCol="0">
+              <a:spAutoFit/>
+            </a:bodyPr>
+            <a:lstStyle/>
+            <a:p>
+              <a:pPr marL="514350" indent="-514350">
+                <a:spcAft>
+                  <a:spcPts val="3600"/>
+                </a:spcAft>
+                <a:buFont typeface="+mj-lt"/>
+                <a:buAutoNum type="arabicParenR" startAt="2"/>
+              </a:pPr>
+              <a:r>
+                <a:rPr lang="de-DE" sz="2800" b="1"/>
+                <a:t>IDS-Match </a:t>
+              </a:r>
+            </a:p>
+          </p:txBody>
+        </p:sp>
+        <p:sp>
+          <p:nvSpPr>
+            <p:cNvPr id="30" name="Textfeld 29">
+              <a:extLst>
+                <a:ext uri="{FF2B5EF4-FFF2-40B4-BE49-F238E27FC236}">
+                  <a16:creationId xmlns:a16="http://schemas.microsoft.com/office/drawing/2014/main" id="{C54033B1-C5CF-3EB9-8867-4CDA95F9A4EB}"/>
+                </a:ext>
+              </a:extLst>
+            </p:cNvPr>
+            <p:cNvSpPr txBox="1"/>
+            <p:nvPr/>
+          </p:nvSpPr>
+          <p:spPr>
+            <a:xfrm>
+              <a:off x="6587355" y="3523962"/>
+              <a:ext cx="582211" cy="1015663"/>
+            </a:xfrm>
+            <a:prstGeom prst="rect">
+              <a:avLst/>
+            </a:prstGeom>
+            <a:noFill/>
+          </p:spPr>
+          <p:txBody>
+            <a:bodyPr wrap="none" rtlCol="0">
+              <a:spAutoFit/>
+            </a:bodyPr>
+            <a:lstStyle/>
+            <a:p>
+              <a:pPr>
+                <a:spcAft>
+                  <a:spcPts val="3600"/>
+                </a:spcAft>
+              </a:pPr>
+              <a:r>
+                <a:rPr lang="de-DE" sz="6000" b="1"/>
+                <a:t>?</a:t>
+              </a:r>
+            </a:p>
+          </p:txBody>
+        </p:sp>
+        <p:pic>
+          <p:nvPicPr>
+            <p:cNvPr id="32" name="Grafik 31">
+              <a:extLst>
+                <a:ext uri="{FF2B5EF4-FFF2-40B4-BE49-F238E27FC236}">
+                  <a16:creationId xmlns:a16="http://schemas.microsoft.com/office/drawing/2014/main" id="{7FE9CFB1-7343-5E9B-E6C7-1F6789F3F8B3}"/>
+                </a:ext>
+              </a:extLst>
+            </p:cNvPr>
+            <p:cNvPicPr>
+              <a:picLocks noChangeAspect="1"/>
+            </p:cNvPicPr>
+            <p:nvPr/>
+          </p:nvPicPr>
+          <p:blipFill>
+            <a:blip r:embed="rId4"/>
+            <a:stretch>
+              <a:fillRect/>
+            </a:stretch>
+          </p:blipFill>
+          <p:spPr>
+            <a:xfrm>
+              <a:off x="5359045" y="4072726"/>
+              <a:ext cx="507541" cy="645350"/>
+            </a:xfrm>
+            <a:prstGeom prst="rect">
+              <a:avLst/>
+            </a:prstGeom>
+          </p:spPr>
+        </p:pic>
+        <p:pic>
+          <p:nvPicPr>
+            <p:cNvPr id="33" name="Grafik 32">
+              <a:extLst>
+                <a:ext uri="{FF2B5EF4-FFF2-40B4-BE49-F238E27FC236}">
+                  <a16:creationId xmlns:a16="http://schemas.microsoft.com/office/drawing/2014/main" id="{8E654194-0D3B-4F36-516F-8E9E0D05712F}"/>
+                </a:ext>
+              </a:extLst>
+            </p:cNvPr>
+            <p:cNvPicPr>
+              <a:picLocks noChangeAspect="1"/>
+            </p:cNvPicPr>
+            <p:nvPr/>
+          </p:nvPicPr>
+          <p:blipFill>
+            <a:blip r:embed="rId4"/>
+            <a:stretch>
+              <a:fillRect/>
+            </a:stretch>
+          </p:blipFill>
+          <p:spPr>
+            <a:xfrm>
+              <a:off x="7930763" y="4072726"/>
+              <a:ext cx="507541" cy="645350"/>
+            </a:xfrm>
+            <a:prstGeom prst="rect">
+              <a:avLst/>
+            </a:prstGeom>
+          </p:spPr>
+        </p:pic>
+      </p:grpSp>
+      <p:grpSp>
+        <p:nvGrpSpPr>
+          <p:cNvPr id="31" name="Gruppieren 30">
+            <a:extLst>
+              <a:ext uri="{FF2B5EF4-FFF2-40B4-BE49-F238E27FC236}">
+                <a16:creationId xmlns:a16="http://schemas.microsoft.com/office/drawing/2014/main" id="{01F5D0A6-EC11-941D-AB45-ABB54C32AD36}"/>
+              </a:ext>
+            </a:extLst>
+          </p:cNvPr>
+          <p:cNvGrpSpPr/>
+          <p:nvPr/>
+        </p:nvGrpSpPr>
+        <p:grpSpPr>
+          <a:xfrm>
+            <a:off x="838200" y="4913030"/>
+            <a:ext cx="9379753" cy="1599186"/>
+            <a:chOff x="838200" y="5005630"/>
+            <a:chExt cx="9379753" cy="1599186"/>
+          </a:xfrm>
+        </p:grpSpPr>
+        <p:sp>
+          <p:nvSpPr>
+            <p:cNvPr id="29" name="Textfeld 28">
+              <a:extLst>
+                <a:ext uri="{FF2B5EF4-FFF2-40B4-BE49-F238E27FC236}">
+                  <a16:creationId xmlns:a16="http://schemas.microsoft.com/office/drawing/2014/main" id="{CAA1021E-68DA-1706-6844-00DCC6A84464}"/>
+                </a:ext>
+              </a:extLst>
+            </p:cNvPr>
+            <p:cNvSpPr txBox="1"/>
+            <p:nvPr/>
+          </p:nvSpPr>
+          <p:spPr>
+            <a:xfrm>
+              <a:off x="838200" y="5357405"/>
+              <a:ext cx="2389885" cy="523220"/>
+            </a:xfrm>
+            <a:prstGeom prst="rect">
+              <a:avLst/>
+            </a:prstGeom>
+            <a:noFill/>
+          </p:spPr>
+          <p:txBody>
+            <a:bodyPr wrap="none" rtlCol="0">
+              <a:spAutoFit/>
+            </a:bodyPr>
+            <a:lstStyle/>
+            <a:p>
+              <a:pPr marL="514350" indent="-514350">
+                <a:spcAft>
+                  <a:spcPts val="3600"/>
+                </a:spcAft>
+                <a:buFont typeface="+mj-lt"/>
+                <a:buAutoNum type="arabicParenR" startAt="3"/>
+              </a:pPr>
+              <a:r>
+                <a:rPr lang="de-DE" sz="2800" b="1"/>
+                <a:t>IFC-Patch</a:t>
+              </a:r>
+              <a:endParaRPr lang="de-DE" sz="2000" b="1"/>
+            </a:p>
+          </p:txBody>
+        </p:sp>
+        <p:pic>
+          <p:nvPicPr>
+            <p:cNvPr id="35" name="Grafik 34">
+              <a:extLst>
+                <a:ext uri="{FF2B5EF4-FFF2-40B4-BE49-F238E27FC236}">
+                  <a16:creationId xmlns:a16="http://schemas.microsoft.com/office/drawing/2014/main" id="{FF900607-B095-0136-2420-7A0B846D6F9A}"/>
+                </a:ext>
+              </a:extLst>
+            </p:cNvPr>
+            <p:cNvPicPr>
+              <a:picLocks noChangeAspect="1"/>
+            </p:cNvPicPr>
+            <p:nvPr/>
+          </p:nvPicPr>
+          <p:blipFill>
+            <a:blip r:embed="rId5"/>
+            <a:stretch>
+              <a:fillRect/>
+            </a:stretch>
+          </p:blipFill>
+          <p:spPr>
+            <a:xfrm>
+              <a:off x="3710634" y="5102634"/>
+              <a:ext cx="2467340" cy="1502182"/>
+            </a:xfrm>
+            <a:prstGeom prst="rect">
+              <a:avLst/>
+            </a:prstGeom>
+          </p:spPr>
+        </p:pic>
+        <p:pic>
+          <p:nvPicPr>
+            <p:cNvPr id="36" name="Grafik 35">
+              <a:extLst>
+                <a:ext uri="{FF2B5EF4-FFF2-40B4-BE49-F238E27FC236}">
+                  <a16:creationId xmlns:a16="http://schemas.microsoft.com/office/drawing/2014/main" id="{0BF80ED2-1C66-5F61-5D02-29C1806269DC}"/>
+                </a:ext>
+              </a:extLst>
+            </p:cNvPr>
+            <p:cNvPicPr>
+              <a:picLocks noChangeAspect="1"/>
+            </p:cNvPicPr>
+            <p:nvPr/>
+          </p:nvPicPr>
+          <p:blipFill>
+            <a:blip r:embed="rId6"/>
+            <a:stretch>
+              <a:fillRect/>
+            </a:stretch>
+          </p:blipFill>
+          <p:spPr>
+            <a:xfrm rot="10800000">
+              <a:off x="6271714" y="5505539"/>
+              <a:ext cx="1123832" cy="253413"/>
+            </a:xfrm>
+            <a:prstGeom prst="rect">
+              <a:avLst/>
+            </a:prstGeom>
+          </p:spPr>
+        </p:pic>
+        <p:pic>
+          <p:nvPicPr>
+            <p:cNvPr id="38" name="Grafik 37">
+              <a:extLst>
+                <a:ext uri="{FF2B5EF4-FFF2-40B4-BE49-F238E27FC236}">
+                  <a16:creationId xmlns:a16="http://schemas.microsoft.com/office/drawing/2014/main" id="{63DF8F88-1AC6-5543-1FE7-E0EFAB5F7936}"/>
+                </a:ext>
+              </a:extLst>
+            </p:cNvPr>
+            <p:cNvPicPr>
+              <a:picLocks noChangeAspect="1"/>
+            </p:cNvPicPr>
+            <p:nvPr/>
+          </p:nvPicPr>
+          <p:blipFill>
+            <a:blip r:embed="rId7"/>
+            <a:stretch>
+              <a:fillRect/>
+            </a:stretch>
+          </p:blipFill>
+          <p:spPr>
+            <a:xfrm>
+              <a:off x="7711926" y="5005630"/>
+              <a:ext cx="2506027" cy="1506645"/>
+            </a:xfrm>
+            <a:prstGeom prst="rect">
+              <a:avLst/>
+            </a:prstGeom>
+          </p:spPr>
+        </p:pic>
+      </p:grpSp>
+      <p:grpSp>
+        <p:nvGrpSpPr>
+          <p:cNvPr id="27" name="Gruppieren 26">
+            <a:extLst>
+              <a:ext uri="{FF2B5EF4-FFF2-40B4-BE49-F238E27FC236}">
+                <a16:creationId xmlns:a16="http://schemas.microsoft.com/office/drawing/2014/main" id="{5129055E-FE43-2394-2C13-6AA81DCB7E72}"/>
+              </a:ext>
+            </a:extLst>
+          </p:cNvPr>
+          <p:cNvGrpSpPr/>
+          <p:nvPr/>
+        </p:nvGrpSpPr>
+        <p:grpSpPr>
+          <a:xfrm>
+            <a:off x="838200" y="1843770"/>
+            <a:ext cx="9276100" cy="1091543"/>
+            <a:chOff x="838200" y="1843770"/>
+            <a:chExt cx="9276100" cy="1091543"/>
+          </a:xfrm>
+        </p:grpSpPr>
+        <p:grpSp>
+          <p:nvGrpSpPr>
+            <p:cNvPr id="7" name="Gruppieren 6">
+              <a:extLst>
+                <a:ext uri="{FF2B5EF4-FFF2-40B4-BE49-F238E27FC236}">
+                  <a16:creationId xmlns:a16="http://schemas.microsoft.com/office/drawing/2014/main" id="{079BC87C-E5B3-9CA0-C743-2645C9D7DF49}"/>
+                </a:ext>
+              </a:extLst>
+            </p:cNvPr>
+            <p:cNvGrpSpPr/>
+            <p:nvPr/>
+          </p:nvGrpSpPr>
+          <p:grpSpPr>
+            <a:xfrm>
+              <a:off x="838200" y="1920087"/>
+              <a:ext cx="6566237" cy="929721"/>
+              <a:chOff x="838200" y="1920087"/>
+              <a:chExt cx="6566237" cy="929721"/>
+            </a:xfrm>
+          </p:grpSpPr>
+          <p:sp>
+            <p:nvSpPr>
+              <p:cNvPr id="4" name="Textfeld 3">
+                <a:extLst>
+                  <a:ext uri="{FF2B5EF4-FFF2-40B4-BE49-F238E27FC236}">
+                    <a16:creationId xmlns:a16="http://schemas.microsoft.com/office/drawing/2014/main" id="{E96B6E5E-99A3-6CAB-EEFA-FAA63741310A}"/>
+                  </a:ext>
+                </a:extLst>
+              </p:cNvPr>
+              <p:cNvSpPr txBox="1"/>
+              <p:nvPr/>
+            </p:nvSpPr>
+            <p:spPr>
+              <a:xfrm>
+                <a:off x="838200" y="2095436"/>
+                <a:ext cx="2264018" cy="523220"/>
+              </a:xfrm>
+              <a:prstGeom prst="rect">
+                <a:avLst/>
+              </a:prstGeom>
+              <a:noFill/>
+            </p:spPr>
+            <p:txBody>
+              <a:bodyPr wrap="none" rtlCol="0">
+                <a:spAutoFit/>
+              </a:bodyPr>
+              <a:lstStyle/>
+              <a:p>
+                <a:pPr marL="457200" indent="-457200">
+                  <a:spcAft>
+                    <a:spcPts val="3600"/>
+                  </a:spcAft>
+                  <a:buAutoNum type="arabicParenR"/>
+                </a:pPr>
+                <a:r>
+                  <a:rPr lang="de-DE" sz="2800" b="1"/>
+                  <a:t>IDS-</a:t>
+                </a:r>
+                <a:r>
+                  <a:rPr lang="de-DE" sz="2800" b="1" err="1"/>
+                  <a:t>Fetch</a:t>
+                </a:r>
+                <a:endParaRPr lang="de-DE" sz="2800" b="1"/>
+              </a:p>
+            </p:txBody>
+          </p:sp>
+          <p:pic>
+            <p:nvPicPr>
+              <p:cNvPr id="5" name="Grafik 4">
+                <a:extLst>
+                  <a:ext uri="{FF2B5EF4-FFF2-40B4-BE49-F238E27FC236}">
+                    <a16:creationId xmlns:a16="http://schemas.microsoft.com/office/drawing/2014/main" id="{B151736C-6F30-64D5-2740-24D40E519AD2}"/>
+                  </a:ext>
+                </a:extLst>
+              </p:cNvPr>
+              <p:cNvPicPr>
+                <a:picLocks noChangeAspect="1"/>
+              </p:cNvPicPr>
+              <p:nvPr/>
+            </p:nvPicPr>
+            <p:blipFill>
+              <a:blip r:embed="rId8"/>
+              <a:stretch>
+                <a:fillRect/>
+              </a:stretch>
+            </p:blipFill>
+            <p:spPr>
+              <a:xfrm>
+                <a:off x="3442423" y="1920087"/>
+                <a:ext cx="2575783" cy="929721"/>
+              </a:xfrm>
+              <a:prstGeom prst="rect">
+                <a:avLst/>
+              </a:prstGeom>
+            </p:spPr>
+          </p:pic>
+          <p:pic>
+            <p:nvPicPr>
+              <p:cNvPr id="6" name="Grafik 5">
+                <a:extLst>
+                  <a:ext uri="{FF2B5EF4-FFF2-40B4-BE49-F238E27FC236}">
+                    <a16:creationId xmlns:a16="http://schemas.microsoft.com/office/drawing/2014/main" id="{9E873447-5152-37CC-4D37-5A0CB941A749}"/>
+                  </a:ext>
+                </a:extLst>
+              </p:cNvPr>
+              <p:cNvPicPr>
+                <a:picLocks noChangeAspect="1"/>
+              </p:cNvPicPr>
+              <p:nvPr/>
+            </p:nvPicPr>
+            <p:blipFill>
+              <a:blip r:embed="rId6"/>
+              <a:stretch>
+                <a:fillRect/>
+              </a:stretch>
+            </p:blipFill>
+            <p:spPr>
+              <a:xfrm>
+                <a:off x="6280605" y="2189726"/>
+                <a:ext cx="1123832" cy="253413"/>
+              </a:xfrm>
+              <a:prstGeom prst="rect">
+                <a:avLst/>
+              </a:prstGeom>
+            </p:spPr>
+          </p:pic>
+        </p:grpSp>
+        <p:pic>
+          <p:nvPicPr>
+            <p:cNvPr id="26" name="Grafik 25">
+              <a:extLst>
+                <a:ext uri="{FF2B5EF4-FFF2-40B4-BE49-F238E27FC236}">
+                  <a16:creationId xmlns:a16="http://schemas.microsoft.com/office/drawing/2014/main" id="{1B853570-3DC2-3B74-E061-338E418FFB47}"/>
+                </a:ext>
+              </a:extLst>
+            </p:cNvPr>
+            <p:cNvPicPr>
+              <a:picLocks noChangeAspect="1"/>
+            </p:cNvPicPr>
+            <p:nvPr/>
+          </p:nvPicPr>
+          <p:blipFill>
+            <a:blip r:embed="rId9"/>
+            <a:stretch>
+              <a:fillRect/>
+            </a:stretch>
+          </p:blipFill>
+          <p:spPr>
+            <a:xfrm>
+              <a:off x="7617877" y="1843770"/>
+              <a:ext cx="2496423" cy="1091543"/>
+            </a:xfrm>
+            <a:prstGeom prst="rect">
+              <a:avLst/>
+            </a:prstGeom>
+          </p:spPr>
+        </p:pic>
+      </p:grpSp>
+      <p:sp>
+        <p:nvSpPr>
+          <p:cNvPr id="34" name="Textfeld 33">
+            <a:extLst>
+              <a:ext uri="{FF2B5EF4-FFF2-40B4-BE49-F238E27FC236}">
+                <a16:creationId xmlns:a16="http://schemas.microsoft.com/office/drawing/2014/main" id="{7FF790FB-6040-19B1-91E1-77F57230B0B9}"/>
               </a:ext>
             </a:extLst>
           </p:cNvPr>
@@ -5922,8 +6410,8 @@
         </p:nvSpPr>
         <p:spPr>
           <a:xfrm>
-            <a:off x="838200" y="2095436"/>
-            <a:ext cx="2264018" cy="523220"/>
+            <a:off x="3390868" y="6492875"/>
+            <a:ext cx="5410264" cy="338554"/>
           </a:xfrm>
           <a:prstGeom prst="rect">
             <a:avLst/>
@@ -5936,526 +6424,13 @@
           </a:bodyPr>
           <a:lstStyle/>
           <a:p>
-            <a:pPr marL="457200" indent="-457200">
-              <a:spcAft>
-                <a:spcPts val="3600"/>
-              </a:spcAft>
-              <a:buAutoNum type="arabicParenR"/>
-            </a:pPr>
-            <a:r>
-              <a:rPr lang="de-DE" sz="2800" b="1" dirty="0"/>
-              <a:t>IDS-</a:t>
-            </a:r>
-            <a:r>
-              <a:rPr lang="de-DE" sz="2800" b="1" dirty="0" err="1"/>
-              <a:t>Fetch</a:t>
-            </a:r>
-            <a:endParaRPr lang="de-DE" sz="2800" b="1" dirty="0"/>
-          </a:p>
-        </p:txBody>
-      </p:sp>
-      <p:pic>
-        <p:nvPicPr>
-          <p:cNvPr id="5" name="Grafik 4">
-            <a:extLst>
-              <a:ext uri="{FF2B5EF4-FFF2-40B4-BE49-F238E27FC236}">
-                <a16:creationId xmlns:a16="http://schemas.microsoft.com/office/drawing/2014/main" id="{B151736C-6F30-64D5-2740-24D40E519AD2}"/>
-              </a:ext>
-            </a:extLst>
-          </p:cNvPr>
-          <p:cNvPicPr>
-            <a:picLocks noChangeAspect="1"/>
-          </p:cNvPicPr>
-          <p:nvPr/>
-        </p:nvPicPr>
-        <p:blipFill>
-          <a:blip r:embed="rId3"/>
-          <a:stretch>
-            <a:fillRect/>
-          </a:stretch>
-        </p:blipFill>
-        <p:spPr>
-          <a:xfrm>
-            <a:off x="3442423" y="1920087"/>
-            <a:ext cx="2575783" cy="929721"/>
-          </a:xfrm>
-          <a:prstGeom prst="rect">
-            <a:avLst/>
-          </a:prstGeom>
-        </p:spPr>
-      </p:pic>
-      <p:pic>
-        <p:nvPicPr>
-          <p:cNvPr id="6" name="Grafik 5">
-            <a:extLst>
-              <a:ext uri="{FF2B5EF4-FFF2-40B4-BE49-F238E27FC236}">
-                <a16:creationId xmlns:a16="http://schemas.microsoft.com/office/drawing/2014/main" id="{9E873447-5152-37CC-4D37-5A0CB941A749}"/>
-              </a:ext>
-            </a:extLst>
-          </p:cNvPr>
-          <p:cNvPicPr>
-            <a:picLocks noChangeAspect="1"/>
-          </p:cNvPicPr>
-          <p:nvPr/>
-        </p:nvPicPr>
-        <p:blipFill>
-          <a:blip r:embed="rId4"/>
-          <a:stretch>
-            <a:fillRect/>
-          </a:stretch>
-        </p:blipFill>
-        <p:spPr>
-          <a:xfrm>
-            <a:off x="6280605" y="2189726"/>
-            <a:ext cx="1123832" cy="253413"/>
-          </a:xfrm>
-          <a:prstGeom prst="rect">
-            <a:avLst/>
-          </a:prstGeom>
-        </p:spPr>
-      </p:pic>
-      <p:pic>
-        <p:nvPicPr>
-          <p:cNvPr id="8" name="Grafik 7">
-            <a:extLst>
-              <a:ext uri="{FF2B5EF4-FFF2-40B4-BE49-F238E27FC236}">
-                <a16:creationId xmlns:a16="http://schemas.microsoft.com/office/drawing/2014/main" id="{73A275EA-DD5F-0B49-6456-616EF402E76E}"/>
-              </a:ext>
-            </a:extLst>
-          </p:cNvPr>
-          <p:cNvPicPr>
-            <a:picLocks noChangeAspect="1"/>
-          </p:cNvPicPr>
-          <p:nvPr/>
-        </p:nvPicPr>
-        <p:blipFill>
-          <a:blip r:embed="rId5"/>
-          <a:stretch>
-            <a:fillRect/>
-          </a:stretch>
-        </p:blipFill>
-        <p:spPr>
-          <a:xfrm>
-            <a:off x="7617877" y="1775055"/>
-            <a:ext cx="1133314" cy="1063357"/>
-          </a:xfrm>
-          <a:prstGeom prst="rect">
-            <a:avLst/>
-          </a:prstGeom>
-        </p:spPr>
-      </p:pic>
-      <p:sp>
-        <p:nvSpPr>
-          <p:cNvPr id="12" name="Inhaltsplatzhalter 2">
-            <a:extLst>
-              <a:ext uri="{FF2B5EF4-FFF2-40B4-BE49-F238E27FC236}">
-                <a16:creationId xmlns:a16="http://schemas.microsoft.com/office/drawing/2014/main" id="{C1C5EEDD-1A66-582E-D617-0CF6532E1A26}"/>
-              </a:ext>
-            </a:extLst>
-          </p:cNvPr>
-          <p:cNvSpPr>
-            <a:spLocks noGrp="1"/>
-          </p:cNvSpPr>
-          <p:nvPr>
-            <p:ph idx="1"/>
-          </p:nvPr>
-        </p:nvSpPr>
-        <p:spPr>
-          <a:xfrm>
-            <a:off x="9219928" y="2548626"/>
-            <a:ext cx="1245243" cy="416688"/>
-          </a:xfrm>
-        </p:spPr>
-        <p:txBody>
-          <a:bodyPr>
-            <a:normAutofit fontScale="92500" lnSpcReduction="20000"/>
-          </a:bodyPr>
-          <a:lstStyle/>
-          <a:p>
-            <a:pPr marL="0" indent="0">
-              <a:buNone/>
-            </a:pPr>
-            <a:r>
-              <a:rPr lang="de-DE" dirty="0" err="1">
-                <a:solidFill>
-                  <a:srgbClr val="209E41"/>
-                </a:solidFill>
-              </a:rPr>
-              <a:t>onsai</a:t>
-            </a:r>
-            <a:endParaRPr lang="de-DE" dirty="0">
-              <a:solidFill>
-                <a:srgbClr val="209E41"/>
-              </a:solidFill>
-            </a:endParaRPr>
-          </a:p>
-        </p:txBody>
-      </p:sp>
-      <p:pic>
-        <p:nvPicPr>
-          <p:cNvPr id="15" name="Grafik 14">
-            <a:extLst>
-              <a:ext uri="{FF2B5EF4-FFF2-40B4-BE49-F238E27FC236}">
-                <a16:creationId xmlns:a16="http://schemas.microsoft.com/office/drawing/2014/main" id="{87EF8C25-E980-B213-4B50-70986791D884}"/>
-              </a:ext>
-            </a:extLst>
-          </p:cNvPr>
-          <p:cNvPicPr>
-            <a:picLocks noChangeAspect="1"/>
-          </p:cNvPicPr>
-          <p:nvPr/>
-        </p:nvPicPr>
-        <p:blipFill>
-          <a:blip r:embed="rId6"/>
-          <a:stretch>
-            <a:fillRect/>
-          </a:stretch>
-        </p:blipFill>
-        <p:spPr>
-          <a:xfrm>
-            <a:off x="8751191" y="2323872"/>
-            <a:ext cx="564051" cy="547462"/>
-          </a:xfrm>
-          <a:prstGeom prst="rect">
-            <a:avLst/>
-          </a:prstGeom>
-        </p:spPr>
-      </p:pic>
-      <p:pic>
-        <p:nvPicPr>
-          <p:cNvPr id="24" name="Grafik 23">
-            <a:extLst>
-              <a:ext uri="{FF2B5EF4-FFF2-40B4-BE49-F238E27FC236}">
-                <a16:creationId xmlns:a16="http://schemas.microsoft.com/office/drawing/2014/main" id="{6241EC17-2A4A-43B2-1315-C043C903D36C}"/>
-              </a:ext>
-            </a:extLst>
-          </p:cNvPr>
-          <p:cNvPicPr>
-            <a:picLocks noChangeAspect="1"/>
-          </p:cNvPicPr>
-          <p:nvPr/>
-        </p:nvPicPr>
-        <p:blipFill>
-          <a:blip r:embed="rId7"/>
-          <a:stretch>
-            <a:fillRect/>
-          </a:stretch>
-        </p:blipFill>
-        <p:spPr>
-          <a:xfrm>
-            <a:off x="4325318" y="3626660"/>
-            <a:ext cx="922100" cy="853514"/>
-          </a:xfrm>
-          <a:prstGeom prst="rect">
-            <a:avLst/>
-          </a:prstGeom>
-        </p:spPr>
-      </p:pic>
-      <p:pic>
-        <p:nvPicPr>
-          <p:cNvPr id="25" name="Grafik 24">
-            <a:extLst>
-              <a:ext uri="{FF2B5EF4-FFF2-40B4-BE49-F238E27FC236}">
-                <a16:creationId xmlns:a16="http://schemas.microsoft.com/office/drawing/2014/main" id="{DE67A584-7277-B55D-5975-5DE7E44479BF}"/>
-              </a:ext>
-            </a:extLst>
-          </p:cNvPr>
-          <p:cNvPicPr>
-            <a:picLocks noChangeAspect="1"/>
-          </p:cNvPicPr>
-          <p:nvPr/>
-        </p:nvPicPr>
-        <p:blipFill>
-          <a:blip r:embed="rId7"/>
-          <a:stretch>
-            <a:fillRect/>
-          </a:stretch>
-        </p:blipFill>
-        <p:spPr>
-          <a:xfrm>
-            <a:off x="8407903" y="3626660"/>
-            <a:ext cx="922100" cy="853514"/>
-          </a:xfrm>
-          <a:prstGeom prst="rect">
-            <a:avLst/>
-          </a:prstGeom>
-        </p:spPr>
-      </p:pic>
-      <p:sp>
-        <p:nvSpPr>
-          <p:cNvPr id="28" name="Textfeld 27">
-            <a:extLst>
-              <a:ext uri="{FF2B5EF4-FFF2-40B4-BE49-F238E27FC236}">
-                <a16:creationId xmlns:a16="http://schemas.microsoft.com/office/drawing/2014/main" id="{AEB91BED-E477-D873-BE35-D6D64FC544EB}"/>
-              </a:ext>
-            </a:extLst>
-          </p:cNvPr>
-          <p:cNvSpPr txBox="1"/>
-          <p:nvPr/>
-        </p:nvSpPr>
-        <p:spPr>
-          <a:xfrm>
-            <a:off x="838200" y="3768996"/>
-            <a:ext cx="2570704" cy="523220"/>
-          </a:xfrm>
-          <a:prstGeom prst="rect">
-            <a:avLst/>
-          </a:prstGeom>
-          <a:noFill/>
-        </p:spPr>
-        <p:txBody>
-          <a:bodyPr wrap="none" rtlCol="0">
-            <a:spAutoFit/>
-          </a:bodyPr>
-          <a:lstStyle/>
-          <a:p>
-            <a:pPr marL="514350" indent="-514350">
-              <a:spcAft>
-                <a:spcPts val="3600"/>
-              </a:spcAft>
-              <a:buFont typeface="+mj-lt"/>
-              <a:buAutoNum type="arabicParenR" startAt="2"/>
-            </a:pPr>
-            <a:r>
-              <a:rPr lang="de-DE" sz="2800" b="1" dirty="0"/>
-              <a:t>IDS-Match </a:t>
-            </a:r>
-          </a:p>
-        </p:txBody>
-      </p:sp>
-      <p:sp>
-        <p:nvSpPr>
-          <p:cNvPr id="29" name="Textfeld 28">
-            <a:extLst>
-              <a:ext uri="{FF2B5EF4-FFF2-40B4-BE49-F238E27FC236}">
-                <a16:creationId xmlns:a16="http://schemas.microsoft.com/office/drawing/2014/main" id="{CAA1021E-68DA-1706-6844-00DCC6A84464}"/>
-              </a:ext>
-            </a:extLst>
-          </p:cNvPr>
-          <p:cNvSpPr txBox="1"/>
-          <p:nvPr/>
-        </p:nvSpPr>
-        <p:spPr>
-          <a:xfrm>
-            <a:off x="838200" y="5357405"/>
-            <a:ext cx="2389885" cy="523220"/>
-          </a:xfrm>
-          <a:prstGeom prst="rect">
-            <a:avLst/>
-          </a:prstGeom>
-          <a:noFill/>
-        </p:spPr>
-        <p:txBody>
-          <a:bodyPr wrap="none" rtlCol="0">
-            <a:spAutoFit/>
-          </a:bodyPr>
-          <a:lstStyle/>
-          <a:p>
-            <a:pPr marL="514350" indent="-514350">
-              <a:spcAft>
-                <a:spcPts val="3600"/>
-              </a:spcAft>
-              <a:buFont typeface="+mj-lt"/>
-              <a:buAutoNum type="arabicParenR" startAt="3"/>
-            </a:pPr>
-            <a:r>
-              <a:rPr lang="de-DE" sz="2800" b="1" dirty="0"/>
-              <a:t>IFC-Patch</a:t>
-            </a:r>
-            <a:endParaRPr lang="de-DE" sz="2000" b="1" dirty="0"/>
-          </a:p>
-        </p:txBody>
-      </p:sp>
-      <p:sp>
-        <p:nvSpPr>
-          <p:cNvPr id="30" name="Textfeld 29">
-            <a:extLst>
-              <a:ext uri="{FF2B5EF4-FFF2-40B4-BE49-F238E27FC236}">
-                <a16:creationId xmlns:a16="http://schemas.microsoft.com/office/drawing/2014/main" id="{C54033B1-C5CF-3EB9-8867-4CDA95F9A4EB}"/>
-              </a:ext>
-            </a:extLst>
-          </p:cNvPr>
-          <p:cNvSpPr txBox="1"/>
-          <p:nvPr/>
-        </p:nvSpPr>
-        <p:spPr>
-          <a:xfrm>
-            <a:off x="6587355" y="3523962"/>
-            <a:ext cx="582211" cy="1015663"/>
-          </a:xfrm>
-          <a:prstGeom prst="rect">
-            <a:avLst/>
-          </a:prstGeom>
-          <a:noFill/>
-        </p:spPr>
-        <p:txBody>
-          <a:bodyPr wrap="none" rtlCol="0">
-            <a:spAutoFit/>
-          </a:bodyPr>
-          <a:lstStyle/>
-          <a:p>
-            <a:pPr>
-              <a:spcAft>
-                <a:spcPts val="3600"/>
-              </a:spcAft>
-            </a:pPr>
-            <a:r>
-              <a:rPr lang="de-DE" sz="6000" b="1" dirty="0"/>
-              <a:t>?</a:t>
-            </a:r>
-          </a:p>
-        </p:txBody>
-      </p:sp>
-      <p:pic>
-        <p:nvPicPr>
-          <p:cNvPr id="32" name="Grafik 31">
-            <a:extLst>
-              <a:ext uri="{FF2B5EF4-FFF2-40B4-BE49-F238E27FC236}">
-                <a16:creationId xmlns:a16="http://schemas.microsoft.com/office/drawing/2014/main" id="{7FE9CFB1-7343-5E9B-E6C7-1F6789F3F8B3}"/>
-              </a:ext>
-            </a:extLst>
-          </p:cNvPr>
-          <p:cNvPicPr>
-            <a:picLocks noChangeAspect="1"/>
-          </p:cNvPicPr>
-          <p:nvPr/>
-        </p:nvPicPr>
-        <p:blipFill>
-          <a:blip r:embed="rId8"/>
-          <a:stretch>
-            <a:fillRect/>
-          </a:stretch>
-        </p:blipFill>
-        <p:spPr>
-          <a:xfrm>
-            <a:off x="5359045" y="4072726"/>
-            <a:ext cx="507541" cy="645350"/>
-          </a:xfrm>
-          <a:prstGeom prst="rect">
-            <a:avLst/>
-          </a:prstGeom>
-        </p:spPr>
-      </p:pic>
-      <p:pic>
-        <p:nvPicPr>
-          <p:cNvPr id="33" name="Grafik 32">
-            <a:extLst>
-              <a:ext uri="{FF2B5EF4-FFF2-40B4-BE49-F238E27FC236}">
-                <a16:creationId xmlns:a16="http://schemas.microsoft.com/office/drawing/2014/main" id="{8E654194-0D3B-4F36-516F-8E9E0D05712F}"/>
-              </a:ext>
-            </a:extLst>
-          </p:cNvPr>
-          <p:cNvPicPr>
-            <a:picLocks noChangeAspect="1"/>
-          </p:cNvPicPr>
-          <p:nvPr/>
-        </p:nvPicPr>
-        <p:blipFill>
-          <a:blip r:embed="rId8"/>
-          <a:stretch>
-            <a:fillRect/>
-          </a:stretch>
-        </p:blipFill>
-        <p:spPr>
-          <a:xfrm>
-            <a:off x="7930763" y="4072726"/>
-            <a:ext cx="507541" cy="645350"/>
-          </a:xfrm>
-          <a:prstGeom prst="rect">
-            <a:avLst/>
-          </a:prstGeom>
-        </p:spPr>
-      </p:pic>
-      <p:pic>
-        <p:nvPicPr>
-          <p:cNvPr id="35" name="Grafik 34">
-            <a:extLst>
-              <a:ext uri="{FF2B5EF4-FFF2-40B4-BE49-F238E27FC236}">
-                <a16:creationId xmlns:a16="http://schemas.microsoft.com/office/drawing/2014/main" id="{FF900607-B095-0136-2420-7A0B846D6F9A}"/>
-              </a:ext>
-            </a:extLst>
-          </p:cNvPr>
-          <p:cNvPicPr>
-            <a:picLocks noChangeAspect="1"/>
-          </p:cNvPicPr>
-          <p:nvPr/>
-        </p:nvPicPr>
-        <p:blipFill>
-          <a:blip r:embed="rId9"/>
-          <a:stretch>
-            <a:fillRect/>
-          </a:stretch>
-        </p:blipFill>
-        <p:spPr>
-          <a:xfrm>
-            <a:off x="7731270" y="5107097"/>
-            <a:ext cx="2467340" cy="1502182"/>
-          </a:xfrm>
-          <a:prstGeom prst="rect">
-            <a:avLst/>
-          </a:prstGeom>
-        </p:spPr>
-      </p:pic>
-      <p:pic>
-        <p:nvPicPr>
-          <p:cNvPr id="36" name="Grafik 35">
-            <a:extLst>
-              <a:ext uri="{FF2B5EF4-FFF2-40B4-BE49-F238E27FC236}">
-                <a16:creationId xmlns:a16="http://schemas.microsoft.com/office/drawing/2014/main" id="{0BF80ED2-1C66-5F61-5D02-29C1806269DC}"/>
-              </a:ext>
-            </a:extLst>
-          </p:cNvPr>
-          <p:cNvPicPr>
-            <a:picLocks noChangeAspect="1"/>
-          </p:cNvPicPr>
-          <p:nvPr/>
-        </p:nvPicPr>
-        <p:blipFill>
-          <a:blip r:embed="rId4"/>
-          <a:stretch>
-            <a:fillRect/>
-          </a:stretch>
-        </p:blipFill>
-        <p:spPr>
-          <a:xfrm rot="10800000">
-            <a:off x="6271714" y="5505539"/>
-            <a:ext cx="1123832" cy="253413"/>
-          </a:xfrm>
-          <a:prstGeom prst="rect">
-            <a:avLst/>
-          </a:prstGeom>
-        </p:spPr>
-      </p:pic>
-      <p:pic>
-        <p:nvPicPr>
-          <p:cNvPr id="38" name="Grafik 37">
-            <a:extLst>
-              <a:ext uri="{FF2B5EF4-FFF2-40B4-BE49-F238E27FC236}">
-                <a16:creationId xmlns:a16="http://schemas.microsoft.com/office/drawing/2014/main" id="{63DF8F88-1AC6-5543-1FE7-E0EFAB5F7936}"/>
-              </a:ext>
-            </a:extLst>
-          </p:cNvPr>
-          <p:cNvPicPr>
-            <a:picLocks noChangeAspect="1"/>
-          </p:cNvPicPr>
-          <p:nvPr/>
-        </p:nvPicPr>
-        <p:blipFill>
-          <a:blip r:embed="rId10"/>
-          <a:stretch>
-            <a:fillRect/>
-          </a:stretch>
-        </p:blipFill>
-        <p:spPr>
-          <a:xfrm>
-            <a:off x="3651076" y="5102634"/>
-            <a:ext cx="2506027" cy="1506645"/>
-          </a:xfrm>
-          <a:prstGeom prst="rect">
-            <a:avLst/>
-          </a:prstGeom>
-        </p:spPr>
-      </p:pic>
+            <a:r>
+              <a:rPr lang="de-DE" sz="1600"/>
+              <a:t>Team Bonsai – Hackathon zum BIM-Portal des Bundes 2025</a:t>
+            </a:r>
+          </a:p>
+        </p:txBody>
+      </p:sp>
     </p:spTree>
     <p:extLst>
       <p:ext uri="{BB962C8B-B14F-4D97-AF65-F5344CB8AC3E}">
@@ -6466,10 +6441,199 @@
   <p:clrMapOvr>
     <a:masterClrMapping/>
   </p:clrMapOvr>
+  <p:timing>
+    <p:tnLst>
+      <p:par>
+        <p:cTn id="1" dur="indefinite" restart="never" nodeType="tmRoot">
+          <p:childTnLst>
+            <p:seq concurrent="1" nextAc="seek">
+              <p:cTn id="2" dur="indefinite" nodeType="mainSeq">
+                <p:childTnLst>
+                  <p:par>
+                    <p:cTn id="3" fill="hold">
+                      <p:stCondLst>
+                        <p:cond delay="indefinite"/>
+                      </p:stCondLst>
+                      <p:childTnLst>
+                        <p:par>
+                          <p:cTn id="4" fill="hold">
+                            <p:stCondLst>
+                              <p:cond delay="0"/>
+                            </p:stCondLst>
+                            <p:childTnLst>
+                              <p:par>
+                                <p:cTn id="5" presetID="22" presetClass="entr" presetSubtype="8" fill="hold" nodeType="clickEffect">
+                                  <p:stCondLst>
+                                    <p:cond delay="0"/>
+                                  </p:stCondLst>
+                                  <p:childTnLst>
+                                    <p:set>
+                                      <p:cBhvr>
+                                        <p:cTn id="6" dur="1" fill="hold">
+                                          <p:stCondLst>
+                                            <p:cond delay="0"/>
+                                          </p:stCondLst>
+                                        </p:cTn>
+                                        <p:tgtEl>
+                                          <p:spTgt spid="27"/>
+                                        </p:tgtEl>
+                                        <p:attrNameLst>
+                                          <p:attrName>style.visibility</p:attrName>
+                                        </p:attrNameLst>
+                                      </p:cBhvr>
+                                      <p:to>
+                                        <p:strVal val="visible"/>
+                                      </p:to>
+                                    </p:set>
+                                    <p:animEffect transition="in" filter="wipe(left)">
+                                      <p:cBhvr>
+                                        <p:cTn id="7" dur="500"/>
+                                        <p:tgtEl>
+                                          <p:spTgt spid="27"/>
+                                        </p:tgtEl>
+                                      </p:cBhvr>
+                                    </p:animEffect>
+                                  </p:childTnLst>
+                                </p:cTn>
+                              </p:par>
+                            </p:childTnLst>
+                          </p:cTn>
+                        </p:par>
+                      </p:childTnLst>
+                    </p:cTn>
+                  </p:par>
+                  <p:par>
+                    <p:cTn id="8" fill="hold">
+                      <p:stCondLst>
+                        <p:cond delay="indefinite"/>
+                      </p:stCondLst>
+                      <p:childTnLst>
+                        <p:par>
+                          <p:cTn id="9" fill="hold">
+                            <p:stCondLst>
+                              <p:cond delay="0"/>
+                            </p:stCondLst>
+                            <p:childTnLst>
+                              <p:par>
+                                <p:cTn id="10" presetID="22" presetClass="entr" presetSubtype="8" fill="hold" nodeType="clickEffect">
+                                  <p:stCondLst>
+                                    <p:cond delay="0"/>
+                                  </p:stCondLst>
+                                  <p:childTnLst>
+                                    <p:set>
+                                      <p:cBhvr>
+                                        <p:cTn id="11" dur="1" fill="hold">
+                                          <p:stCondLst>
+                                            <p:cond delay="0"/>
+                                          </p:stCondLst>
+                                        </p:cTn>
+                                        <p:tgtEl>
+                                          <p:spTgt spid="3"/>
+                                        </p:tgtEl>
+                                        <p:attrNameLst>
+                                          <p:attrName>style.visibility</p:attrName>
+                                        </p:attrNameLst>
+                                      </p:cBhvr>
+                                      <p:to>
+                                        <p:strVal val="visible"/>
+                                      </p:to>
+                                    </p:set>
+                                    <p:animEffect transition="in" filter="wipe(left)">
+                                      <p:cBhvr>
+                                        <p:cTn id="12" dur="500"/>
+                                        <p:tgtEl>
+                                          <p:spTgt spid="3"/>
+                                        </p:tgtEl>
+                                      </p:cBhvr>
+                                    </p:animEffect>
+                                  </p:childTnLst>
+                                </p:cTn>
+                              </p:par>
+                            </p:childTnLst>
+                          </p:cTn>
+                        </p:par>
+                      </p:childTnLst>
+                    </p:cTn>
+                  </p:par>
+                  <p:par>
+                    <p:cTn id="13" fill="hold">
+                      <p:stCondLst>
+                        <p:cond delay="indefinite"/>
+                      </p:stCondLst>
+                      <p:childTnLst>
+                        <p:par>
+                          <p:cTn id="14" fill="hold">
+                            <p:stCondLst>
+                              <p:cond delay="0"/>
+                            </p:stCondLst>
+                            <p:childTnLst>
+                              <p:par>
+                                <p:cTn id="15" presetID="22" presetClass="entr" presetSubtype="2" fill="hold" nodeType="clickEffect">
+                                  <p:stCondLst>
+                                    <p:cond delay="0"/>
+                                  </p:stCondLst>
+                                  <p:childTnLst>
+                                    <p:set>
+                                      <p:cBhvr>
+                                        <p:cTn id="16" dur="1" fill="hold">
+                                          <p:stCondLst>
+                                            <p:cond delay="0"/>
+                                          </p:stCondLst>
+                                        </p:cTn>
+                                        <p:tgtEl>
+                                          <p:spTgt spid="31"/>
+                                        </p:tgtEl>
+                                        <p:attrNameLst>
+                                          <p:attrName>style.visibility</p:attrName>
+                                        </p:attrNameLst>
+                                      </p:cBhvr>
+                                      <p:to>
+                                        <p:strVal val="visible"/>
+                                      </p:to>
+                                    </p:set>
+                                    <p:animEffect transition="in" filter="wipe(right)">
+                                      <p:cBhvr>
+                                        <p:cTn id="17" dur="500"/>
+                                        <p:tgtEl>
+                                          <p:spTgt spid="31"/>
+                                        </p:tgtEl>
+                                      </p:cBhvr>
+                                    </p:animEffect>
+                                  </p:childTnLst>
+                                </p:cTn>
+                              </p:par>
+                            </p:childTnLst>
+                          </p:cTn>
+                        </p:par>
+                      </p:childTnLst>
+                    </p:cTn>
+                  </p:par>
+                </p:childTnLst>
+              </p:cTn>
+              <p:prevCondLst>
+                <p:cond evt="onPrev" delay="0">
+                  <p:tgtEl>
+                    <p:sldTgt/>
+                  </p:tgtEl>
+                </p:cond>
+              </p:prevCondLst>
+              <p:nextCondLst>
+                <p:cond evt="onNext" delay="0">
+                  <p:tgtEl>
+                    <p:sldTgt/>
+                  </p:tgtEl>
+                </p:cond>
+              </p:nextCondLst>
+            </p:seq>
+          </p:childTnLst>
+        </p:cTn>
+      </p:par>
+    </p:tnLst>
+  </p:timing>
 </p:sld>
 </file>
 
-<file path=ppt/slides/slide7.xml><?xml version="1.0" encoding="utf-8"?>
+<file path=ppt/slides/slide6.xml><?xml version="1.0" encoding="utf-8"?>
 <p:sld xmlns:a="http://schemas.openxmlformats.org/drawingml/2006/main" xmlns:r="http://schemas.openxmlformats.org/officeDocument/2006/relationships" xmlns:p="http://schemas.openxmlformats.org/presentationml/2006/main">
   <p:cSld>
     <p:spTree>
@@ -6514,8 +6678,8 @@
           <a:lstStyle/>
           <a:p>
             <a:r>
-              <a:rPr lang="de-DE" sz="4000" b="1" dirty="0"/>
-              <a:t>Lösung</a:t>
+              <a:rPr lang="de-DE" sz="4000" b="1"/>
+              <a:t>Live-Demo</a:t>
             </a:r>
           </a:p>
         </p:txBody>
@@ -6535,7 +6699,7 @@
         <p:spPr>
           <a:xfrm>
             <a:off x="871443" y="1352461"/>
-            <a:ext cx="7378558" cy="400110"/>
+            <a:ext cx="7431458" cy="707886"/>
           </a:xfrm>
           <a:prstGeom prst="rect">
             <a:avLst/>
@@ -6549,18 +6713,49 @@
           <a:lstStyle/>
           <a:p>
             <a:r>
-              <a:rPr lang="de-DE" sz="2000" dirty="0"/>
-              <a:t>Optimierter Workflow des Planers trifft Anforderung des Bauherrn</a:t>
-            </a:r>
-          </a:p>
-        </p:txBody>
-      </p:sp>
-      <p:sp>
-        <p:nvSpPr>
-          <p:cNvPr id="4" name="Textfeld 3">
-            <a:extLst>
-              <a:ext uri="{FF2B5EF4-FFF2-40B4-BE49-F238E27FC236}">
-                <a16:creationId xmlns:a16="http://schemas.microsoft.com/office/drawing/2014/main" id="{F83488A9-59F5-36BE-80CE-6AEB8EF0AD8A}"/>
+              <a:rPr lang="de-DE" sz="2000"/>
+              <a:t>Optimierter Workflow des Planers trifft Anforderung des Bauherrn </a:t>
+            </a:r>
+            <a:br>
+              <a:rPr lang="de-DE" sz="2000"/>
+            </a:br>
+            <a:r>
+              <a:rPr lang="de-DE" sz="2000"/>
+              <a:t>mit den </a:t>
+            </a:r>
+            <a:r>
+              <a:rPr lang="de-DE" sz="2000" b="1" i="1"/>
+              <a:t>Fetch</a:t>
+            </a:r>
+            <a:r>
+              <a:rPr lang="de-DE" sz="2000"/>
+              <a:t>, </a:t>
+            </a:r>
+            <a:r>
+              <a:rPr lang="de-DE" sz="2000" b="1" i="1"/>
+              <a:t>Match</a:t>
+            </a:r>
+            <a:r>
+              <a:rPr lang="de-DE" sz="2000"/>
+              <a:t> und </a:t>
+            </a:r>
+            <a:r>
+              <a:rPr lang="de-DE" sz="2000" b="1" i="1"/>
+              <a:t>Patch</a:t>
+            </a:r>
+            <a:r>
+              <a:rPr lang="de-DE" sz="2000"/>
+              <a:t> - BonsaiBIM-Extensions</a:t>
+            </a:r>
+          </a:p>
+        </p:txBody>
+      </p:sp>
+      <p:sp>
+        <p:nvSpPr>
+          <p:cNvPr id="3" name="Textfeld 2">
+            <a:extLst>
+              <a:ext uri="{FF2B5EF4-FFF2-40B4-BE49-F238E27FC236}">
+                <a16:creationId xmlns:a16="http://schemas.microsoft.com/office/drawing/2014/main" id="{F5CCD90D-39CB-5DDB-1BD0-ABBF5AD9A393}"/>
               </a:ext>
             </a:extLst>
           </p:cNvPr>
@@ -6569,8 +6764,8 @@
         </p:nvSpPr>
         <p:spPr>
           <a:xfrm>
-            <a:off x="838200" y="2095436"/>
-            <a:ext cx="2215928" cy="523220"/>
+            <a:off x="3390868" y="6492875"/>
+            <a:ext cx="5410264" cy="338554"/>
           </a:xfrm>
           <a:prstGeom prst="rect">
             <a:avLst/>
@@ -6583,30 +6778,113 @@
           </a:bodyPr>
           <a:lstStyle/>
           <a:p>
-            <a:pPr marL="457200" indent="-457200">
-              <a:spcAft>
-                <a:spcPts val="3600"/>
-              </a:spcAft>
-              <a:buAutoNum type="arabicParenR"/>
-            </a:pPr>
-            <a:r>
-              <a:rPr lang="de-DE" sz="2800" b="1" dirty="0"/>
-              <a:t>IDS </a:t>
-            </a:r>
-            <a:r>
-              <a:rPr lang="de-DE" sz="2800" b="1" dirty="0" err="1"/>
-              <a:t>Fetch</a:t>
-            </a:r>
-            <a:endParaRPr lang="de-DE" sz="2800" b="1" dirty="0"/>
-          </a:p>
-        </p:txBody>
-      </p:sp>
-      <p:sp>
-        <p:nvSpPr>
-          <p:cNvPr id="28" name="Textfeld 27">
-            <a:extLst>
-              <a:ext uri="{FF2B5EF4-FFF2-40B4-BE49-F238E27FC236}">
-                <a16:creationId xmlns:a16="http://schemas.microsoft.com/office/drawing/2014/main" id="{F9E9DD45-8E09-03DD-FCA9-6DD0F55AEED3}"/>
+            <a:r>
+              <a:rPr lang="de-DE" sz="1600"/>
+              <a:t>Team Bonsai – Hackathon zum BIM-Portal des Bundes 2025</a:t>
+            </a:r>
+          </a:p>
+        </p:txBody>
+      </p:sp>
+    </p:spTree>
+    <p:extLst>
+      <p:ext uri="{BB962C8B-B14F-4D97-AF65-F5344CB8AC3E}">
+        <p14:creationId xmlns:p14="http://schemas.microsoft.com/office/powerpoint/2010/main" val="585886147"/>
+      </p:ext>
+    </p:extLst>
+  </p:cSld>
+  <p:clrMapOvr>
+    <a:masterClrMapping/>
+  </p:clrMapOvr>
+</p:sld>
+</file>
+
+<file path=ppt/slides/slide7.xml><?xml version="1.0" encoding="utf-8"?>
+<p:sld xmlns:a="http://schemas.openxmlformats.org/drawingml/2006/main" xmlns:r="http://schemas.openxmlformats.org/officeDocument/2006/relationships" xmlns:p="http://schemas.openxmlformats.org/presentationml/2006/main">
+  <p:cSld>
+    <p:spTree>
+      <p:nvGrpSpPr>
+        <p:cNvPr id="1" name=""/>
+        <p:cNvGrpSpPr/>
+        <p:nvPr/>
+      </p:nvGrpSpPr>
+      <p:grpSpPr>
+        <a:xfrm>
+          <a:off x="0" y="0"/>
+          <a:ext cx="0" cy="0"/>
+          <a:chOff x="0" y="0"/>
+          <a:chExt cx="0" cy="0"/>
+        </a:xfrm>
+      </p:grpSpPr>
+      <p:sp>
+        <p:nvSpPr>
+          <p:cNvPr id="6" name="Titel 1">
+            <a:extLst>
+              <a:ext uri="{FF2B5EF4-FFF2-40B4-BE49-F238E27FC236}">
+                <a16:creationId xmlns:a16="http://schemas.microsoft.com/office/drawing/2014/main" id="{A6510EF9-66E8-B61F-ACA1-FD05EBEA4D5F}"/>
+              </a:ext>
+            </a:extLst>
+          </p:cNvPr>
+          <p:cNvSpPr>
+            <a:spLocks noGrp="1"/>
+          </p:cNvSpPr>
+          <p:nvPr>
+            <p:ph type="title"/>
+          </p:nvPr>
+        </p:nvSpPr>
+        <p:spPr>
+          <a:xfrm>
+            <a:off x="838200" y="365125"/>
+            <a:ext cx="10515600" cy="1325563"/>
+          </a:xfrm>
+        </p:spPr>
+        <p:txBody>
+          <a:bodyPr/>
+          <a:lstStyle/>
+          <a:p>
+            <a:r>
+              <a:rPr lang="de-DE" sz="4000" b="1"/>
+              <a:t>Lösung</a:t>
+            </a:r>
+            <a:endParaRPr lang="de-DE" sz="4000"/>
+          </a:p>
+        </p:txBody>
+      </p:sp>
+      <p:pic>
+        <p:nvPicPr>
+          <p:cNvPr id="8" name="Grafik 7">
+            <a:extLst>
+              <a:ext uri="{FF2B5EF4-FFF2-40B4-BE49-F238E27FC236}">
+                <a16:creationId xmlns:a16="http://schemas.microsoft.com/office/drawing/2014/main" id="{47896E6A-5DFC-9E56-43F3-D5BFFAC8693E}"/>
+              </a:ext>
+            </a:extLst>
+          </p:cNvPr>
+          <p:cNvPicPr>
+            <a:picLocks noChangeAspect="1"/>
+          </p:cNvPicPr>
+          <p:nvPr/>
+        </p:nvPicPr>
+        <p:blipFill>
+          <a:blip r:embed="rId2"/>
+          <a:stretch>
+            <a:fillRect/>
+          </a:stretch>
+        </p:blipFill>
+        <p:spPr>
+          <a:xfrm>
+            <a:off x="1319513" y="2569166"/>
+            <a:ext cx="6944811" cy="3740355"/>
+          </a:xfrm>
+          <a:prstGeom prst="rect">
+            <a:avLst/>
+          </a:prstGeom>
+        </p:spPr>
+      </p:pic>
+      <p:sp>
+        <p:nvSpPr>
+          <p:cNvPr id="9" name="Textfeld 8">
+            <a:extLst>
+              <a:ext uri="{FF2B5EF4-FFF2-40B4-BE49-F238E27FC236}">
+                <a16:creationId xmlns:a16="http://schemas.microsoft.com/office/drawing/2014/main" id="{ADC627BB-E011-F1AA-E57A-EB62B84D9B6A}"/>
               </a:ext>
             </a:extLst>
           </p:cNvPr>
@@ -6615,8 +6893,8 @@
         </p:nvSpPr>
         <p:spPr>
           <a:xfrm>
-            <a:off x="838200" y="3768996"/>
-            <a:ext cx="2448876" cy="523220"/>
+            <a:off x="871443" y="1352461"/>
+            <a:ext cx="9298571" cy="1477328"/>
           </a:xfrm>
           <a:prstGeom prst="rect">
             <a:avLst/>
@@ -6629,26 +6907,101 @@
           </a:bodyPr>
           <a:lstStyle/>
           <a:p>
-            <a:pPr marL="514350" indent="-514350">
+            <a:pPr marL="342900" indent="-342900">
               <a:spcAft>
-                <a:spcPts val="3600"/>
+                <a:spcPts val="600"/>
               </a:spcAft>
-              <a:buFont typeface="+mj-lt"/>
-              <a:buAutoNum type="arabicParenR" startAt="2"/>
+              <a:buFontTx/>
+              <a:buChar char="-"/>
             </a:pPr>
             <a:r>
-              <a:rPr lang="de-DE" sz="2800" b="1" dirty="0"/>
-              <a:t>IDS Match </a:t>
-            </a:r>
-          </a:p>
-        </p:txBody>
-      </p:sp>
-      <p:sp>
-        <p:nvSpPr>
-          <p:cNvPr id="29" name="Textfeld 28">
-            <a:extLst>
-              <a:ext uri="{FF2B5EF4-FFF2-40B4-BE49-F238E27FC236}">
-                <a16:creationId xmlns:a16="http://schemas.microsoft.com/office/drawing/2014/main" id="{5ADCDA0E-6519-2735-EEBF-B6AA55D741E4}"/>
+              <a:rPr lang="de-DE" sz="2000"/>
+              <a:t>Umsetzung in </a:t>
+            </a:r>
+            <a:r>
+              <a:rPr lang="de-DE" sz="2000" b="1"/>
+              <a:t>Python</a:t>
+            </a:r>
+            <a:r>
+              <a:rPr lang="de-DE" sz="2000"/>
+              <a:t> als Extension für </a:t>
+            </a:r>
+            <a:r>
+              <a:rPr lang="de-DE" sz="2000" b="1"/>
+              <a:t>Blender</a:t>
+            </a:r>
+            <a:r>
+              <a:rPr lang="de-DE" sz="2000"/>
+              <a:t> + </a:t>
+            </a:r>
+            <a:r>
+              <a:rPr lang="de-DE" sz="2000" b="1" err="1"/>
+              <a:t>BonsaiBIM</a:t>
+            </a:r>
+            <a:r>
+              <a:rPr lang="de-DE" sz="2000" b="1"/>
+              <a:t> </a:t>
+            </a:r>
+            <a:r>
+              <a:rPr lang="de-DE" sz="2000"/>
+              <a:t>und</a:t>
+            </a:r>
+            <a:r>
+              <a:rPr lang="de-DE" sz="2000" b="1"/>
+              <a:t> </a:t>
+            </a:r>
+            <a:r>
+              <a:rPr lang="de-DE" sz="2000" b="1" err="1"/>
+              <a:t>ifcOpenShell</a:t>
+            </a:r>
+            <a:endParaRPr lang="de-DE" sz="2000" b="1"/>
+          </a:p>
+          <a:p>
+            <a:pPr marL="342900" indent="-342900">
+              <a:spcAft>
+                <a:spcPts val="600"/>
+              </a:spcAft>
+              <a:buFontTx/>
+              <a:buChar char="-"/>
+            </a:pPr>
+            <a:r>
+              <a:rPr lang="de-DE" sz="2000"/>
+              <a:t>Codesharing über </a:t>
+            </a:r>
+            <a:r>
+              <a:rPr lang="de-DE" sz="2000" err="1"/>
+              <a:t>Github</a:t>
+            </a:r>
+            <a:r>
+              <a:rPr lang="de-DE" sz="2000"/>
+              <a:t>:</a:t>
+            </a:r>
+            <a:br>
+              <a:rPr lang="de-DE" sz="2000"/>
+            </a:br>
+            <a:r>
+              <a:rPr lang="de-DE" sz="2000">
+                <a:hlinkClick r:id="rId3"/>
+              </a:rPr>
+              <a:t>https://github.com/bimhelden/PyScripts4BPHackathon2025/</a:t>
+            </a:r>
+            <a:endParaRPr lang="de-DE" sz="2000"/>
+          </a:p>
+          <a:p>
+            <a:pPr marL="342900" indent="-342900">
+              <a:buFontTx/>
+              <a:buChar char="-"/>
+            </a:pPr>
+            <a:endParaRPr lang="de-DE" sz="2000"/>
+          </a:p>
+        </p:txBody>
+      </p:sp>
+      <p:sp>
+        <p:nvSpPr>
+          <p:cNvPr id="10" name="Textfeld 9">
+            <a:extLst>
+              <a:ext uri="{FF2B5EF4-FFF2-40B4-BE49-F238E27FC236}">
+                <a16:creationId xmlns:a16="http://schemas.microsoft.com/office/drawing/2014/main" id="{ADE65787-DE85-5FEA-F6F0-73C765B01D53}"/>
               </a:ext>
             </a:extLst>
           </p:cNvPr>
@@ -6657,8 +7010,8 @@
         </p:nvSpPr>
         <p:spPr>
           <a:xfrm>
-            <a:off x="838200" y="5357405"/>
-            <a:ext cx="2262799" cy="523220"/>
+            <a:off x="3390868" y="6492875"/>
+            <a:ext cx="5410264" cy="338554"/>
           </a:xfrm>
           <a:prstGeom prst="rect">
             <a:avLst/>
@@ -6671,25 +7024,17 @@
           </a:bodyPr>
           <a:lstStyle/>
           <a:p>
-            <a:pPr marL="514350" indent="-514350">
-              <a:spcAft>
-                <a:spcPts val="3600"/>
-              </a:spcAft>
-              <a:buFont typeface="+mj-lt"/>
-              <a:buAutoNum type="arabicParenR" startAt="3"/>
-            </a:pPr>
-            <a:r>
-              <a:rPr lang="de-DE" sz="2800" b="1" dirty="0"/>
-              <a:t>IFC Patch</a:t>
-            </a:r>
-            <a:endParaRPr lang="de-DE" sz="2000" b="1" dirty="0"/>
+            <a:r>
+              <a:rPr lang="de-DE" sz="1600"/>
+              <a:t>Team Bonsai – Hackathon zum BIM-Portal des Bundes 2025</a:t>
+            </a:r>
           </a:p>
         </p:txBody>
       </p:sp>
     </p:spTree>
     <p:extLst>
       <p:ext uri="{BB962C8B-B14F-4D97-AF65-F5344CB8AC3E}">
-        <p14:creationId xmlns:p14="http://schemas.microsoft.com/office/powerpoint/2010/main" val="585886147"/>
+        <p14:creationId xmlns:p14="http://schemas.microsoft.com/office/powerpoint/2010/main" val="173354279"/>
       </p:ext>
     </p:extLst>
   </p:cSld>
@@ -6707,7 +7052,7 @@
         <p:cNvPr id="1" name="">
           <a:extLst>
             <a:ext uri="{FF2B5EF4-FFF2-40B4-BE49-F238E27FC236}">
-              <a16:creationId xmlns:a16="http://schemas.microsoft.com/office/drawing/2014/main" id="{208119B4-C031-2A04-3764-629E6B944213}"/>
+              <a16:creationId xmlns:a16="http://schemas.microsoft.com/office/drawing/2014/main" id="{C3A63B10-9474-33C1-E0CA-141657ED4184}"/>
             </a:ext>
           </a:extLst>
         </p:cNvPr>
@@ -6722,48 +7067,40 @@
           <a:chExt cx="0" cy="0"/>
         </a:xfrm>
       </p:grpSpPr>
+      <p:sp>
+        <p:nvSpPr>
+          <p:cNvPr id="2" name="Titel 1">
+            <a:extLst>
+              <a:ext uri="{FF2B5EF4-FFF2-40B4-BE49-F238E27FC236}">
+                <a16:creationId xmlns:a16="http://schemas.microsoft.com/office/drawing/2014/main" id="{4B7F350F-5055-EE90-5B24-A83DA4D9AFF4}"/>
+              </a:ext>
+            </a:extLst>
+          </p:cNvPr>
+          <p:cNvSpPr>
+            <a:spLocks noGrp="1"/>
+          </p:cNvSpPr>
+          <p:nvPr>
+            <p:ph type="title"/>
+          </p:nvPr>
+        </p:nvSpPr>
+        <p:spPr/>
+        <p:txBody>
+          <a:bodyPr/>
+          <a:lstStyle/>
+          <a:p>
+            <a:r>
+              <a:rPr lang="de-DE" sz="4000" b="1"/>
+              <a:t>Vielen Dank!</a:t>
+            </a:r>
+          </a:p>
+        </p:txBody>
+      </p:sp>
       <p:pic>
         <p:nvPicPr>
-          <p:cNvPr id="5" name="Grafik 4" descr="Ein Bild, das Text, Menschliches Gesicht, Person, Cartoon enthält.&#10;&#10;KI-generierte Inhalte können fehlerhaft sein.">
-            <a:extLst>
-              <a:ext uri="{FF2B5EF4-FFF2-40B4-BE49-F238E27FC236}">
-                <a16:creationId xmlns:a16="http://schemas.microsoft.com/office/drawing/2014/main" id="{A8B10B56-AC78-0E11-0D6E-E852A270923F}"/>
-              </a:ext>
-            </a:extLst>
-          </p:cNvPr>
-          <p:cNvPicPr>
-            <a:picLocks noChangeAspect="1"/>
-          </p:cNvPicPr>
-          <p:nvPr/>
-        </p:nvPicPr>
-        <p:blipFill>
-          <a:blip r:embed="rId2">
-            <a:extLst>
-              <a:ext uri="{28A0092B-C50C-407E-A947-70E740481C1C}">
-                <a14:useLocalDpi xmlns:a14="http://schemas.microsoft.com/office/drawing/2010/main" val="0"/>
-              </a:ext>
-            </a:extLst>
-          </a:blip>
-          <a:stretch>
-            <a:fillRect/>
-          </a:stretch>
-        </p:blipFill>
-        <p:spPr>
-          <a:xfrm>
-            <a:off x="5414" y="0"/>
-            <a:ext cx="12181172" cy="6858000"/>
-          </a:xfrm>
-          <a:prstGeom prst="rect">
-            <a:avLst/>
-          </a:prstGeom>
-        </p:spPr>
-      </p:pic>
-      <p:pic>
-        <p:nvPicPr>
-          <p:cNvPr id="6" name="Grafik 5">
-            <a:extLst>
-              <a:ext uri="{FF2B5EF4-FFF2-40B4-BE49-F238E27FC236}">
-                <a16:creationId xmlns:a16="http://schemas.microsoft.com/office/drawing/2014/main" id="{ABC7446F-632F-BF31-018A-76816A345985}"/>
+          <p:cNvPr id="5" name="Grafik 4">
+            <a:extLst>
+              <a:ext uri="{FF2B5EF4-FFF2-40B4-BE49-F238E27FC236}">
+                <a16:creationId xmlns:a16="http://schemas.microsoft.com/office/drawing/2014/main" id="{8C14D9FC-80AF-E329-9301-D5239FF17C58}"/>
               </a:ext>
             </a:extLst>
           </p:cNvPr>
@@ -6780,8 +7117,8 @@
         </p:blipFill>
         <p:spPr>
           <a:xfrm>
-            <a:off x="6279786" y="1006999"/>
-            <a:ext cx="2323911" cy="2180460"/>
+            <a:off x="747774" y="1725413"/>
+            <a:ext cx="8543559" cy="4022018"/>
           </a:xfrm>
           <a:prstGeom prst="rect">
             <a:avLst/>
@@ -6791,25 +7128,13 @@
     </p:spTree>
     <p:extLst>
       <p:ext uri="{BB962C8B-B14F-4D97-AF65-F5344CB8AC3E}">
-        <p14:creationId xmlns:p14="http://schemas.microsoft.com/office/powerpoint/2010/main" val="3881082950"/>
+        <p14:creationId xmlns:p14="http://schemas.microsoft.com/office/powerpoint/2010/main" val="2876751373"/>
       </p:ext>
     </p:extLst>
   </p:cSld>
   <p:clrMapOvr>
     <a:masterClrMapping/>
   </p:clrMapOvr>
-  <mc:AlternateContent xmlns:mc="http://schemas.openxmlformats.org/markup-compatibility/2006">
-    <mc:Choice xmlns:p159="http://schemas.microsoft.com/office/powerpoint/2015/09/main" Requires="p159">
-      <p:transition xmlns:p14="http://schemas.microsoft.com/office/powerpoint/2010/main" spd="slow" p14:dur="2000">
-        <p159:morph option="byObject"/>
-      </p:transition>
-    </mc:Choice>
-    <mc:Fallback>
-      <p:transition spd="slow">
-        <p:fade/>
-      </p:transition>
-    </mc:Fallback>
-  </mc:AlternateContent>
 </p:sld>
 </file>
 

</xml_diff>